<commit_message>
23/11/2023 X-Ray Measurements Report Stopped on Sample12_device3
</commit_message>
<xml_diff>
--- a/Mikhail Bandurist Transistors/X-Ray Measurements (01-11-17-11)/Report 20-11-2023 on X-Ray measurements.pptx
+++ b/Mikhail Bandurist Transistors/X-Ray Measurements (01-11-17-11)/Report 20-11-2023 on X-Ray measurements.pptx
@@ -2,28 +2,32 @@
 <file path=ppt/presentation.xml><?xml version="1.0" encoding="utf-8"?>
 <p:presentation xmlns:a="http://schemas.openxmlformats.org/drawingml/2006/main" xmlns:r="http://schemas.openxmlformats.org/officeDocument/2006/relationships" xmlns:p="http://schemas.openxmlformats.org/presentationml/2006/main" saveSubsetFonts="1">
   <p:sldMasterIdLst>
-    <p:sldMasterId id="2147483648" r:id="rId1"/>
+    <p:sldMasterId id="2147483696" r:id="rId1"/>
   </p:sldMasterIdLst>
   <p:sldIdLst>
     <p:sldId id="256" r:id="rId2"/>
-    <p:sldId id="257" r:id="rId3"/>
-    <p:sldId id="258" r:id="rId4"/>
-    <p:sldId id="259" r:id="rId5"/>
-    <p:sldId id="260" r:id="rId6"/>
-    <p:sldId id="261" r:id="rId7"/>
-    <p:sldId id="262" r:id="rId8"/>
-    <p:sldId id="263" r:id="rId9"/>
-    <p:sldId id="264" r:id="rId10"/>
-    <p:sldId id="265" r:id="rId11"/>
-    <p:sldId id="266" r:id="rId12"/>
+    <p:sldId id="268" r:id="rId3"/>
+    <p:sldId id="257" r:id="rId4"/>
+    <p:sldId id="258" r:id="rId5"/>
+    <p:sldId id="259" r:id="rId6"/>
+    <p:sldId id="260" r:id="rId7"/>
+    <p:sldId id="261" r:id="rId8"/>
+    <p:sldId id="262" r:id="rId9"/>
+    <p:sldId id="263" r:id="rId10"/>
+    <p:sldId id="264" r:id="rId11"/>
+    <p:sldId id="265" r:id="rId12"/>
+    <p:sldId id="266" r:id="rId13"/>
+    <p:sldId id="267" r:id="rId14"/>
+    <p:sldId id="269" r:id="rId15"/>
+    <p:sldId id="270" r:id="rId16"/>
   </p:sldIdLst>
-  <p:sldSz cx="12192000" cy="6858000"/>
+  <p:sldSz cx="16256000" cy="12192000"/>
   <p:notesSz cx="6858000" cy="9144000"/>
   <p:defaultTextStyle>
     <a:defPPr>
-      <a:defRPr lang="ru-RU"/>
+      <a:defRPr lang="en-US"/>
     </a:defPPr>
-    <a:lvl1pPr marL="0" algn="l" defTabSz="914400" rtl="0" eaLnBrk="1" latinLnBrk="0" hangingPunct="1">
+    <a:lvl1pPr marL="0" algn="l" defTabSz="457200" rtl="0" eaLnBrk="1" latinLnBrk="0" hangingPunct="1">
       <a:defRPr sz="1800" kern="1200">
         <a:solidFill>
           <a:schemeClr val="tx1"/>
@@ -33,7 +37,7 @@
         <a:cs typeface="+mn-cs"/>
       </a:defRPr>
     </a:lvl1pPr>
-    <a:lvl2pPr marL="457200" algn="l" defTabSz="914400" rtl="0" eaLnBrk="1" latinLnBrk="0" hangingPunct="1">
+    <a:lvl2pPr marL="457200" algn="l" defTabSz="457200" rtl="0" eaLnBrk="1" latinLnBrk="0" hangingPunct="1">
       <a:defRPr sz="1800" kern="1200">
         <a:solidFill>
           <a:schemeClr val="tx1"/>
@@ -43,7 +47,7 @@
         <a:cs typeface="+mn-cs"/>
       </a:defRPr>
     </a:lvl2pPr>
-    <a:lvl3pPr marL="914400" algn="l" defTabSz="914400" rtl="0" eaLnBrk="1" latinLnBrk="0" hangingPunct="1">
+    <a:lvl3pPr marL="914400" algn="l" defTabSz="457200" rtl="0" eaLnBrk="1" latinLnBrk="0" hangingPunct="1">
       <a:defRPr sz="1800" kern="1200">
         <a:solidFill>
           <a:schemeClr val="tx1"/>
@@ -53,7 +57,7 @@
         <a:cs typeface="+mn-cs"/>
       </a:defRPr>
     </a:lvl3pPr>
-    <a:lvl4pPr marL="1371600" algn="l" defTabSz="914400" rtl="0" eaLnBrk="1" latinLnBrk="0" hangingPunct="1">
+    <a:lvl4pPr marL="1371600" algn="l" defTabSz="457200" rtl="0" eaLnBrk="1" latinLnBrk="0" hangingPunct="1">
       <a:defRPr sz="1800" kern="1200">
         <a:solidFill>
           <a:schemeClr val="tx1"/>
@@ -63,7 +67,7 @@
         <a:cs typeface="+mn-cs"/>
       </a:defRPr>
     </a:lvl4pPr>
-    <a:lvl5pPr marL="1828800" algn="l" defTabSz="914400" rtl="0" eaLnBrk="1" latinLnBrk="0" hangingPunct="1">
+    <a:lvl5pPr marL="1828800" algn="l" defTabSz="457200" rtl="0" eaLnBrk="1" latinLnBrk="0" hangingPunct="1">
       <a:defRPr sz="1800" kern="1200">
         <a:solidFill>
           <a:schemeClr val="tx1"/>
@@ -73,7 +77,7 @@
         <a:cs typeface="+mn-cs"/>
       </a:defRPr>
     </a:lvl5pPr>
-    <a:lvl6pPr marL="2286000" algn="l" defTabSz="914400" rtl="0" eaLnBrk="1" latinLnBrk="0" hangingPunct="1">
+    <a:lvl6pPr marL="2286000" algn="l" defTabSz="457200" rtl="0" eaLnBrk="1" latinLnBrk="0" hangingPunct="1">
       <a:defRPr sz="1800" kern="1200">
         <a:solidFill>
           <a:schemeClr val="tx1"/>
@@ -83,7 +87,7 @@
         <a:cs typeface="+mn-cs"/>
       </a:defRPr>
     </a:lvl6pPr>
-    <a:lvl7pPr marL="2743200" algn="l" defTabSz="914400" rtl="0" eaLnBrk="1" latinLnBrk="0" hangingPunct="1">
+    <a:lvl7pPr marL="2743200" algn="l" defTabSz="457200" rtl="0" eaLnBrk="1" latinLnBrk="0" hangingPunct="1">
       <a:defRPr sz="1800" kern="1200">
         <a:solidFill>
           <a:schemeClr val="tx1"/>
@@ -93,7 +97,7 @@
         <a:cs typeface="+mn-cs"/>
       </a:defRPr>
     </a:lvl7pPr>
-    <a:lvl8pPr marL="3200400" algn="l" defTabSz="914400" rtl="0" eaLnBrk="1" latinLnBrk="0" hangingPunct="1">
+    <a:lvl8pPr marL="3200400" algn="l" defTabSz="457200" rtl="0" eaLnBrk="1" latinLnBrk="0" hangingPunct="1">
       <a:defRPr sz="1800" kern="1200">
         <a:solidFill>
           <a:schemeClr val="tx1"/>
@@ -103,7 +107,7 @@
         <a:cs typeface="+mn-cs"/>
       </a:defRPr>
     </a:lvl8pPr>
-    <a:lvl9pPr marL="3657600" algn="l" defTabSz="914400" rtl="0" eaLnBrk="1" latinLnBrk="0" hangingPunct="1">
+    <a:lvl9pPr marL="3657600" algn="l" defTabSz="457200" rtl="0" eaLnBrk="1" latinLnBrk="0" hangingPunct="1">
       <a:defRPr sz="1800" kern="1200">
         <a:solidFill>
           <a:schemeClr val="tx1"/>
@@ -114,6 +118,11 @@
       </a:defRPr>
     </a:lvl9pPr>
   </p:defaultTextStyle>
+  <p:extLst>
+    <p:ext uri="{EFAFB233-063F-42B5-8137-9DF3F51BA10A}">
+      <p15:sldGuideLst xmlns:p15="http://schemas.microsoft.com/office/powerpoint/2012/main"/>
+    </p:ext>
+  </p:extLst>
 </p:presentation>
 </file>
 
@@ -136,13 +145,7 @@
       </p:grpSpPr>
       <p:sp>
         <p:nvSpPr>
-          <p:cNvPr id="2" name="Title 1">
-            <a:extLst>
-              <a:ext uri="{FF2B5EF4-FFF2-40B4-BE49-F238E27FC236}">
-                <a16:creationId xmlns:a16="http://schemas.microsoft.com/office/drawing/2014/main" id="{14D38B34-1CFC-0A23-C198-17BDB4749DD9}"/>
-              </a:ext>
-            </a:extLst>
-          </p:cNvPr>
+          <p:cNvPr id="2" name="Title 1"/>
           <p:cNvSpPr>
             <a:spLocks noGrp="1"/>
           </p:cNvSpPr>
@@ -152,15 +155,15 @@
         </p:nvSpPr>
         <p:spPr>
           <a:xfrm>
-            <a:off x="1524000" y="1122363"/>
-            <a:ext cx="9144000" cy="2387600"/>
+            <a:off x="1219200" y="1995312"/>
+            <a:ext cx="13817600" cy="4244622"/>
           </a:xfrm>
         </p:spPr>
         <p:txBody>
           <a:bodyPr anchor="b"/>
           <a:lstStyle>
             <a:lvl1pPr algn="ctr">
-              <a:defRPr sz="6000"/>
+              <a:defRPr sz="10667"/>
             </a:lvl1pPr>
           </a:lstStyle>
           <a:p>
@@ -168,19 +171,13 @@
               <a:rPr lang="en-GB"/>
               <a:t>Click to edit Master title style</a:t>
             </a:r>
-            <a:endParaRPr lang="ru-RU"/>
-          </a:p>
-        </p:txBody>
-      </p:sp>
-      <p:sp>
-        <p:nvSpPr>
-          <p:cNvPr id="3" name="Subtitle 2">
-            <a:extLst>
-              <a:ext uri="{FF2B5EF4-FFF2-40B4-BE49-F238E27FC236}">
-                <a16:creationId xmlns:a16="http://schemas.microsoft.com/office/drawing/2014/main" id="{20081886-F58B-FC40-7723-AE03B75509FE}"/>
-              </a:ext>
-            </a:extLst>
-          </p:cNvPr>
+            <a:endParaRPr lang="en-US" dirty="0"/>
+          </a:p>
+        </p:txBody>
+      </p:sp>
+      <p:sp>
+        <p:nvSpPr>
+          <p:cNvPr id="3" name="Subtitle 2"/>
           <p:cNvSpPr>
             <a:spLocks noGrp="1"/>
           </p:cNvSpPr>
@@ -190,8 +187,8 @@
         </p:nvSpPr>
         <p:spPr>
           <a:xfrm>
-            <a:off x="1524000" y="3602038"/>
-            <a:ext cx="9144000" cy="1655762"/>
+            <a:off x="2032000" y="6403623"/>
+            <a:ext cx="12192000" cy="2943577"/>
           </a:xfrm>
         </p:spPr>
         <p:txBody>
@@ -199,39 +196,39 @@
           <a:lstStyle>
             <a:lvl1pPr marL="0" indent="0" algn="ctr">
               <a:buNone/>
-              <a:defRPr sz="2400"/>
+              <a:defRPr sz="4267"/>
             </a:lvl1pPr>
-            <a:lvl2pPr marL="457200" indent="0" algn="ctr">
-              <a:buNone/>
-              <a:defRPr sz="2000"/>
+            <a:lvl2pPr marL="812810" indent="0" algn="ctr">
+              <a:buNone/>
+              <a:defRPr sz="3556"/>
             </a:lvl2pPr>
-            <a:lvl3pPr marL="914400" indent="0" algn="ctr">
-              <a:buNone/>
-              <a:defRPr sz="1800"/>
+            <a:lvl3pPr marL="1625620" indent="0" algn="ctr">
+              <a:buNone/>
+              <a:defRPr sz="3200"/>
             </a:lvl3pPr>
-            <a:lvl4pPr marL="1371600" indent="0" algn="ctr">
-              <a:buNone/>
-              <a:defRPr sz="1600"/>
+            <a:lvl4pPr marL="2438430" indent="0" algn="ctr">
+              <a:buNone/>
+              <a:defRPr sz="2844"/>
             </a:lvl4pPr>
-            <a:lvl5pPr marL="1828800" indent="0" algn="ctr">
-              <a:buNone/>
-              <a:defRPr sz="1600"/>
+            <a:lvl5pPr marL="3251241" indent="0" algn="ctr">
+              <a:buNone/>
+              <a:defRPr sz="2844"/>
             </a:lvl5pPr>
-            <a:lvl6pPr marL="2286000" indent="0" algn="ctr">
-              <a:buNone/>
-              <a:defRPr sz="1600"/>
+            <a:lvl6pPr marL="4064051" indent="0" algn="ctr">
+              <a:buNone/>
+              <a:defRPr sz="2844"/>
             </a:lvl6pPr>
-            <a:lvl7pPr marL="2743200" indent="0" algn="ctr">
-              <a:buNone/>
-              <a:defRPr sz="1600"/>
+            <a:lvl7pPr marL="4876861" indent="0" algn="ctr">
+              <a:buNone/>
+              <a:defRPr sz="2844"/>
             </a:lvl7pPr>
-            <a:lvl8pPr marL="3200400" indent="0" algn="ctr">
-              <a:buNone/>
-              <a:defRPr sz="1600"/>
+            <a:lvl8pPr marL="5689671" indent="0" algn="ctr">
+              <a:buNone/>
+              <a:defRPr sz="2844"/>
             </a:lvl8pPr>
-            <a:lvl9pPr marL="3657600" indent="0" algn="ctr">
-              <a:buNone/>
-              <a:defRPr sz="1600"/>
+            <a:lvl9pPr marL="6502481" indent="0" algn="ctr">
+              <a:buNone/>
+              <a:defRPr sz="2844"/>
             </a:lvl9pPr>
           </a:lstStyle>
           <a:p>
@@ -239,19 +236,13 @@
               <a:rPr lang="en-GB"/>
               <a:t>Click to edit Master subtitle style</a:t>
             </a:r>
-            <a:endParaRPr lang="ru-RU"/>
-          </a:p>
-        </p:txBody>
-      </p:sp>
-      <p:sp>
-        <p:nvSpPr>
-          <p:cNvPr id="4" name="Date Placeholder 3">
-            <a:extLst>
-              <a:ext uri="{FF2B5EF4-FFF2-40B4-BE49-F238E27FC236}">
-                <a16:creationId xmlns:a16="http://schemas.microsoft.com/office/drawing/2014/main" id="{62526AF1-89D8-33C4-072E-2349C5FE5A03}"/>
-              </a:ext>
-            </a:extLst>
-          </p:cNvPr>
+            <a:endParaRPr lang="en-US" dirty="0"/>
+          </a:p>
+        </p:txBody>
+      </p:sp>
+      <p:sp>
+        <p:nvSpPr>
+          <p:cNvPr id="4" name="Date Placeholder 3"/>
           <p:cNvSpPr>
             <a:spLocks noGrp="1"/>
           </p:cNvSpPr>
@@ -274,13 +265,7 @@
       </p:sp>
       <p:sp>
         <p:nvSpPr>
-          <p:cNvPr id="5" name="Footer Placeholder 4">
-            <a:extLst>
-              <a:ext uri="{FF2B5EF4-FFF2-40B4-BE49-F238E27FC236}">
-                <a16:creationId xmlns:a16="http://schemas.microsoft.com/office/drawing/2014/main" id="{4E8ADD41-C984-B72A-7AA7-2749A649B539}"/>
-              </a:ext>
-            </a:extLst>
-          </p:cNvPr>
+          <p:cNvPr id="5" name="Footer Placeholder 4"/>
           <p:cNvSpPr>
             <a:spLocks noGrp="1"/>
           </p:cNvSpPr>
@@ -299,13 +284,7 @@
       </p:sp>
       <p:sp>
         <p:nvSpPr>
-          <p:cNvPr id="6" name="Slide Number Placeholder 5">
-            <a:extLst>
-              <a:ext uri="{FF2B5EF4-FFF2-40B4-BE49-F238E27FC236}">
-                <a16:creationId xmlns:a16="http://schemas.microsoft.com/office/drawing/2014/main" id="{A443F0DD-BCF8-11DF-58D7-ACCF1F5BCEA2}"/>
-              </a:ext>
-            </a:extLst>
-          </p:cNvPr>
+          <p:cNvPr id="6" name="Slide Number Placeholder 5"/>
           <p:cNvSpPr>
             <a:spLocks noGrp="1"/>
           </p:cNvSpPr>
@@ -329,7 +308,7 @@
     </p:spTree>
     <p:extLst>
       <p:ext uri="{BB962C8B-B14F-4D97-AF65-F5344CB8AC3E}">
-        <p14:creationId xmlns:p14="http://schemas.microsoft.com/office/powerpoint/2010/main" val="3204223899"/>
+        <p14:creationId xmlns:p14="http://schemas.microsoft.com/office/powerpoint/2010/main" val="896239075"/>
       </p:ext>
     </p:extLst>
   </p:cSld>
@@ -358,13 +337,7 @@
       </p:grpSpPr>
       <p:sp>
         <p:nvSpPr>
-          <p:cNvPr id="2" name="Title 1">
-            <a:extLst>
-              <a:ext uri="{FF2B5EF4-FFF2-40B4-BE49-F238E27FC236}">
-                <a16:creationId xmlns:a16="http://schemas.microsoft.com/office/drawing/2014/main" id="{8ECA3E38-2677-302A-848C-56329F76DF39}"/>
-              </a:ext>
-            </a:extLst>
-          </p:cNvPr>
+          <p:cNvPr id="2" name="Title 1"/>
           <p:cNvSpPr>
             <a:spLocks noGrp="1"/>
           </p:cNvSpPr>
@@ -381,19 +354,13 @@
               <a:rPr lang="en-GB"/>
               <a:t>Click to edit Master title style</a:t>
             </a:r>
-            <a:endParaRPr lang="ru-RU"/>
-          </a:p>
-        </p:txBody>
-      </p:sp>
-      <p:sp>
-        <p:nvSpPr>
-          <p:cNvPr id="3" name="Vertical Text Placeholder 2">
-            <a:extLst>
-              <a:ext uri="{FF2B5EF4-FFF2-40B4-BE49-F238E27FC236}">
-                <a16:creationId xmlns:a16="http://schemas.microsoft.com/office/drawing/2014/main" id="{789E188D-7117-63CD-5D82-C19C7CAE5673}"/>
-              </a:ext>
-            </a:extLst>
-          </p:cNvPr>
+            <a:endParaRPr lang="en-US" dirty="0"/>
+          </a:p>
+        </p:txBody>
+      </p:sp>
+      <p:sp>
+        <p:nvSpPr>
+          <p:cNvPr id="3" name="Vertical Text Placeholder 2"/>
           <p:cNvSpPr>
             <a:spLocks noGrp="1"/>
           </p:cNvSpPr>
@@ -439,19 +406,13 @@
               <a:rPr lang="en-GB"/>
               <a:t>Fifth level</a:t>
             </a:r>
-            <a:endParaRPr lang="ru-RU"/>
-          </a:p>
-        </p:txBody>
-      </p:sp>
-      <p:sp>
-        <p:nvSpPr>
-          <p:cNvPr id="4" name="Date Placeholder 3">
-            <a:extLst>
-              <a:ext uri="{FF2B5EF4-FFF2-40B4-BE49-F238E27FC236}">
-                <a16:creationId xmlns:a16="http://schemas.microsoft.com/office/drawing/2014/main" id="{4BE56CB3-D6E1-0741-D284-630258F409F8}"/>
-              </a:ext>
-            </a:extLst>
-          </p:cNvPr>
+            <a:endParaRPr lang="en-US" dirty="0"/>
+          </a:p>
+        </p:txBody>
+      </p:sp>
+      <p:sp>
+        <p:nvSpPr>
+          <p:cNvPr id="4" name="Date Placeholder 3"/>
           <p:cNvSpPr>
             <a:spLocks noGrp="1"/>
           </p:cNvSpPr>
@@ -474,13 +435,7 @@
       </p:sp>
       <p:sp>
         <p:nvSpPr>
-          <p:cNvPr id="5" name="Footer Placeholder 4">
-            <a:extLst>
-              <a:ext uri="{FF2B5EF4-FFF2-40B4-BE49-F238E27FC236}">
-                <a16:creationId xmlns:a16="http://schemas.microsoft.com/office/drawing/2014/main" id="{22DE5E9A-CD9A-60CC-2934-89035C55382A}"/>
-              </a:ext>
-            </a:extLst>
-          </p:cNvPr>
+          <p:cNvPr id="5" name="Footer Placeholder 4"/>
           <p:cNvSpPr>
             <a:spLocks noGrp="1"/>
           </p:cNvSpPr>
@@ -499,13 +454,7 @@
       </p:sp>
       <p:sp>
         <p:nvSpPr>
-          <p:cNvPr id="6" name="Slide Number Placeholder 5">
-            <a:extLst>
-              <a:ext uri="{FF2B5EF4-FFF2-40B4-BE49-F238E27FC236}">
-                <a16:creationId xmlns:a16="http://schemas.microsoft.com/office/drawing/2014/main" id="{781D58B6-3AE5-44BD-22E7-D9A582A3609F}"/>
-              </a:ext>
-            </a:extLst>
-          </p:cNvPr>
+          <p:cNvPr id="6" name="Slide Number Placeholder 5"/>
           <p:cNvSpPr>
             <a:spLocks noGrp="1"/>
           </p:cNvSpPr>
@@ -529,7 +478,7 @@
     </p:spTree>
     <p:extLst>
       <p:ext uri="{BB962C8B-B14F-4D97-AF65-F5344CB8AC3E}">
-        <p14:creationId xmlns:p14="http://schemas.microsoft.com/office/powerpoint/2010/main" val="6082567"/>
+        <p14:creationId xmlns:p14="http://schemas.microsoft.com/office/powerpoint/2010/main" val="2650239485"/>
       </p:ext>
     </p:extLst>
   </p:cSld>
@@ -558,13 +507,7 @@
       </p:grpSpPr>
       <p:sp>
         <p:nvSpPr>
-          <p:cNvPr id="2" name="Vertical Title 1">
-            <a:extLst>
-              <a:ext uri="{FF2B5EF4-FFF2-40B4-BE49-F238E27FC236}">
-                <a16:creationId xmlns:a16="http://schemas.microsoft.com/office/drawing/2014/main" id="{13EC208E-1A4C-B7CA-2035-D9E1F90C8ABE}"/>
-              </a:ext>
-            </a:extLst>
-          </p:cNvPr>
+          <p:cNvPr id="2" name="Vertical Title 1"/>
           <p:cNvSpPr>
             <a:spLocks noGrp="1"/>
           </p:cNvSpPr>
@@ -574,8 +517,8 @@
         </p:nvSpPr>
         <p:spPr>
           <a:xfrm>
-            <a:off x="8724900" y="365125"/>
-            <a:ext cx="2628900" cy="5811838"/>
+            <a:off x="11633201" y="649111"/>
+            <a:ext cx="3505200" cy="10332156"/>
           </a:xfrm>
         </p:spPr>
         <p:txBody>
@@ -586,19 +529,13 @@
               <a:rPr lang="en-GB"/>
               <a:t>Click to edit Master title style</a:t>
             </a:r>
-            <a:endParaRPr lang="ru-RU"/>
-          </a:p>
-        </p:txBody>
-      </p:sp>
-      <p:sp>
-        <p:nvSpPr>
-          <p:cNvPr id="3" name="Vertical Text Placeholder 2">
-            <a:extLst>
-              <a:ext uri="{FF2B5EF4-FFF2-40B4-BE49-F238E27FC236}">
-                <a16:creationId xmlns:a16="http://schemas.microsoft.com/office/drawing/2014/main" id="{108CDC5B-958D-DE0F-86B3-F4BF93B49EEE}"/>
-              </a:ext>
-            </a:extLst>
-          </p:cNvPr>
+            <a:endParaRPr lang="en-US" dirty="0"/>
+          </a:p>
+        </p:txBody>
+      </p:sp>
+      <p:sp>
+        <p:nvSpPr>
+          <p:cNvPr id="3" name="Vertical Text Placeholder 2"/>
           <p:cNvSpPr>
             <a:spLocks noGrp="1"/>
           </p:cNvSpPr>
@@ -608,8 +545,8 @@
         </p:nvSpPr>
         <p:spPr>
           <a:xfrm>
-            <a:off x="838200" y="365125"/>
-            <a:ext cx="7734300" cy="5811838"/>
+            <a:off x="1117601" y="649111"/>
+            <a:ext cx="10312400" cy="10332156"/>
           </a:xfrm>
         </p:spPr>
         <p:txBody>
@@ -649,19 +586,13 @@
               <a:rPr lang="en-GB"/>
               <a:t>Fifth level</a:t>
             </a:r>
-            <a:endParaRPr lang="ru-RU"/>
-          </a:p>
-        </p:txBody>
-      </p:sp>
-      <p:sp>
-        <p:nvSpPr>
-          <p:cNvPr id="4" name="Date Placeholder 3">
-            <a:extLst>
-              <a:ext uri="{FF2B5EF4-FFF2-40B4-BE49-F238E27FC236}">
-                <a16:creationId xmlns:a16="http://schemas.microsoft.com/office/drawing/2014/main" id="{C63C7451-B519-603C-8396-92BBC71C2915}"/>
-              </a:ext>
-            </a:extLst>
-          </p:cNvPr>
+            <a:endParaRPr lang="en-US" dirty="0"/>
+          </a:p>
+        </p:txBody>
+      </p:sp>
+      <p:sp>
+        <p:nvSpPr>
+          <p:cNvPr id="4" name="Date Placeholder 3"/>
           <p:cNvSpPr>
             <a:spLocks noGrp="1"/>
           </p:cNvSpPr>
@@ -684,13 +615,7 @@
       </p:sp>
       <p:sp>
         <p:nvSpPr>
-          <p:cNvPr id="5" name="Footer Placeholder 4">
-            <a:extLst>
-              <a:ext uri="{FF2B5EF4-FFF2-40B4-BE49-F238E27FC236}">
-                <a16:creationId xmlns:a16="http://schemas.microsoft.com/office/drawing/2014/main" id="{7485302E-6E40-DEC6-2F29-CC67131995AC}"/>
-              </a:ext>
-            </a:extLst>
-          </p:cNvPr>
+          <p:cNvPr id="5" name="Footer Placeholder 4"/>
           <p:cNvSpPr>
             <a:spLocks noGrp="1"/>
           </p:cNvSpPr>
@@ -709,13 +634,7 @@
       </p:sp>
       <p:sp>
         <p:nvSpPr>
-          <p:cNvPr id="6" name="Slide Number Placeholder 5">
-            <a:extLst>
-              <a:ext uri="{FF2B5EF4-FFF2-40B4-BE49-F238E27FC236}">
-                <a16:creationId xmlns:a16="http://schemas.microsoft.com/office/drawing/2014/main" id="{F960ED64-297B-29A2-7519-EC5F214F41D3}"/>
-              </a:ext>
-            </a:extLst>
-          </p:cNvPr>
+          <p:cNvPr id="6" name="Slide Number Placeholder 5"/>
           <p:cNvSpPr>
             <a:spLocks noGrp="1"/>
           </p:cNvSpPr>
@@ -739,7 +658,7 @@
     </p:spTree>
     <p:extLst>
       <p:ext uri="{BB962C8B-B14F-4D97-AF65-F5344CB8AC3E}">
-        <p14:creationId xmlns:p14="http://schemas.microsoft.com/office/powerpoint/2010/main" val="1474525655"/>
+        <p14:creationId xmlns:p14="http://schemas.microsoft.com/office/powerpoint/2010/main" val="3128699847"/>
       </p:ext>
     </p:extLst>
   </p:cSld>
@@ -768,13 +687,7 @@
       </p:grpSpPr>
       <p:sp>
         <p:nvSpPr>
-          <p:cNvPr id="2" name="Title 1">
-            <a:extLst>
-              <a:ext uri="{FF2B5EF4-FFF2-40B4-BE49-F238E27FC236}">
-                <a16:creationId xmlns:a16="http://schemas.microsoft.com/office/drawing/2014/main" id="{4B9A36D1-D999-1904-6354-C14795E2B864}"/>
-              </a:ext>
-            </a:extLst>
-          </p:cNvPr>
+          <p:cNvPr id="2" name="Title 1"/>
           <p:cNvSpPr>
             <a:spLocks noGrp="1"/>
           </p:cNvSpPr>
@@ -791,19 +704,13 @@
               <a:rPr lang="en-GB"/>
               <a:t>Click to edit Master title style</a:t>
             </a:r>
-            <a:endParaRPr lang="ru-RU"/>
-          </a:p>
-        </p:txBody>
-      </p:sp>
-      <p:sp>
-        <p:nvSpPr>
-          <p:cNvPr id="3" name="Content Placeholder 2">
-            <a:extLst>
-              <a:ext uri="{FF2B5EF4-FFF2-40B4-BE49-F238E27FC236}">
-                <a16:creationId xmlns:a16="http://schemas.microsoft.com/office/drawing/2014/main" id="{977D1C06-3EA4-99FB-ECBC-2F1A56EF2472}"/>
-              </a:ext>
-            </a:extLst>
-          </p:cNvPr>
+            <a:endParaRPr lang="en-US" dirty="0"/>
+          </a:p>
+        </p:txBody>
+      </p:sp>
+      <p:sp>
+        <p:nvSpPr>
+          <p:cNvPr id="3" name="Content Placeholder 2"/>
           <p:cNvSpPr>
             <a:spLocks noGrp="1"/>
           </p:cNvSpPr>
@@ -849,19 +756,13 @@
               <a:rPr lang="en-GB"/>
               <a:t>Fifth level</a:t>
             </a:r>
-            <a:endParaRPr lang="ru-RU"/>
-          </a:p>
-        </p:txBody>
-      </p:sp>
-      <p:sp>
-        <p:nvSpPr>
-          <p:cNvPr id="4" name="Date Placeholder 3">
-            <a:extLst>
-              <a:ext uri="{FF2B5EF4-FFF2-40B4-BE49-F238E27FC236}">
-                <a16:creationId xmlns:a16="http://schemas.microsoft.com/office/drawing/2014/main" id="{4B75EA86-2781-847B-860A-0E00A3534D27}"/>
-              </a:ext>
-            </a:extLst>
-          </p:cNvPr>
+            <a:endParaRPr lang="en-US" dirty="0"/>
+          </a:p>
+        </p:txBody>
+      </p:sp>
+      <p:sp>
+        <p:nvSpPr>
+          <p:cNvPr id="4" name="Date Placeholder 3"/>
           <p:cNvSpPr>
             <a:spLocks noGrp="1"/>
           </p:cNvSpPr>
@@ -884,13 +785,7 @@
       </p:sp>
       <p:sp>
         <p:nvSpPr>
-          <p:cNvPr id="5" name="Footer Placeholder 4">
-            <a:extLst>
-              <a:ext uri="{FF2B5EF4-FFF2-40B4-BE49-F238E27FC236}">
-                <a16:creationId xmlns:a16="http://schemas.microsoft.com/office/drawing/2014/main" id="{C78FD15E-FFE6-2023-D452-C765DC317993}"/>
-              </a:ext>
-            </a:extLst>
-          </p:cNvPr>
+          <p:cNvPr id="5" name="Footer Placeholder 4"/>
           <p:cNvSpPr>
             <a:spLocks noGrp="1"/>
           </p:cNvSpPr>
@@ -909,13 +804,7 @@
       </p:sp>
       <p:sp>
         <p:nvSpPr>
-          <p:cNvPr id="6" name="Slide Number Placeholder 5">
-            <a:extLst>
-              <a:ext uri="{FF2B5EF4-FFF2-40B4-BE49-F238E27FC236}">
-                <a16:creationId xmlns:a16="http://schemas.microsoft.com/office/drawing/2014/main" id="{A975A759-A4A9-00F2-302C-3959EE59D75D}"/>
-              </a:ext>
-            </a:extLst>
-          </p:cNvPr>
+          <p:cNvPr id="6" name="Slide Number Placeholder 5"/>
           <p:cNvSpPr>
             <a:spLocks noGrp="1"/>
           </p:cNvSpPr>
@@ -939,7 +828,7 @@
     </p:spTree>
     <p:extLst>
       <p:ext uri="{BB962C8B-B14F-4D97-AF65-F5344CB8AC3E}">
-        <p14:creationId xmlns:p14="http://schemas.microsoft.com/office/powerpoint/2010/main" val="3703095201"/>
+        <p14:creationId xmlns:p14="http://schemas.microsoft.com/office/powerpoint/2010/main" val="962516110"/>
       </p:ext>
     </p:extLst>
   </p:cSld>
@@ -968,13 +857,7 @@
       </p:grpSpPr>
       <p:sp>
         <p:nvSpPr>
-          <p:cNvPr id="2" name="Title 1">
-            <a:extLst>
-              <a:ext uri="{FF2B5EF4-FFF2-40B4-BE49-F238E27FC236}">
-                <a16:creationId xmlns:a16="http://schemas.microsoft.com/office/drawing/2014/main" id="{F0D75750-C1E2-99E1-9972-80966F2A91D0}"/>
-              </a:ext>
-            </a:extLst>
-          </p:cNvPr>
+          <p:cNvPr id="2" name="Title 1"/>
           <p:cNvSpPr>
             <a:spLocks noGrp="1"/>
           </p:cNvSpPr>
@@ -984,15 +867,15 @@
         </p:nvSpPr>
         <p:spPr>
           <a:xfrm>
-            <a:off x="831850" y="1709738"/>
-            <a:ext cx="10515600" cy="2852737"/>
+            <a:off x="1109134" y="3039537"/>
+            <a:ext cx="14020800" cy="5071532"/>
           </a:xfrm>
         </p:spPr>
         <p:txBody>
           <a:bodyPr anchor="b"/>
           <a:lstStyle>
             <a:lvl1pPr>
-              <a:defRPr sz="6000"/>
+              <a:defRPr sz="10667"/>
             </a:lvl1pPr>
           </a:lstStyle>
           <a:p>
@@ -1000,19 +883,13 @@
               <a:rPr lang="en-GB"/>
               <a:t>Click to edit Master title style</a:t>
             </a:r>
-            <a:endParaRPr lang="ru-RU"/>
-          </a:p>
-        </p:txBody>
-      </p:sp>
-      <p:sp>
-        <p:nvSpPr>
-          <p:cNvPr id="3" name="Text Placeholder 2">
-            <a:extLst>
-              <a:ext uri="{FF2B5EF4-FFF2-40B4-BE49-F238E27FC236}">
-                <a16:creationId xmlns:a16="http://schemas.microsoft.com/office/drawing/2014/main" id="{0DDFE637-73CB-CF13-AABE-A1EE4DEC0241}"/>
-              </a:ext>
-            </a:extLst>
-          </p:cNvPr>
+            <a:endParaRPr lang="en-US" dirty="0"/>
+          </a:p>
+        </p:txBody>
+      </p:sp>
+      <p:sp>
+        <p:nvSpPr>
+          <p:cNvPr id="3" name="Text Placeholder 2"/>
           <p:cNvSpPr>
             <a:spLocks noGrp="1"/>
           </p:cNvSpPr>
@@ -1022,8 +899,8 @@
         </p:nvSpPr>
         <p:spPr>
           <a:xfrm>
-            <a:off x="831850" y="4589463"/>
-            <a:ext cx="10515600" cy="1500187"/>
+            <a:off x="1109134" y="8159048"/>
+            <a:ext cx="14020800" cy="2666999"/>
           </a:xfrm>
         </p:spPr>
         <p:txBody>
@@ -1031,17 +908,15 @@
           <a:lstStyle>
             <a:lvl1pPr marL="0" indent="0">
               <a:buNone/>
-              <a:defRPr sz="2400">
+              <a:defRPr sz="4267">
                 <a:solidFill>
-                  <a:schemeClr val="tx1">
-                    <a:tint val="75000"/>
-                  </a:schemeClr>
+                  <a:schemeClr val="tx1"/>
                 </a:solidFill>
               </a:defRPr>
             </a:lvl1pPr>
-            <a:lvl2pPr marL="457200" indent="0">
-              <a:buNone/>
-              <a:defRPr sz="2000">
+            <a:lvl2pPr marL="812810" indent="0">
+              <a:buNone/>
+              <a:defRPr sz="3556">
                 <a:solidFill>
                   <a:schemeClr val="tx1">
                     <a:tint val="75000"/>
@@ -1049,9 +924,9 @@
                 </a:solidFill>
               </a:defRPr>
             </a:lvl2pPr>
-            <a:lvl3pPr marL="914400" indent="0">
-              <a:buNone/>
-              <a:defRPr sz="1800">
+            <a:lvl3pPr marL="1625620" indent="0">
+              <a:buNone/>
+              <a:defRPr sz="3200">
                 <a:solidFill>
                   <a:schemeClr val="tx1">
                     <a:tint val="75000"/>
@@ -1059,9 +934,9 @@
                 </a:solidFill>
               </a:defRPr>
             </a:lvl3pPr>
-            <a:lvl4pPr marL="1371600" indent="0">
-              <a:buNone/>
-              <a:defRPr sz="1600">
+            <a:lvl4pPr marL="2438430" indent="0">
+              <a:buNone/>
+              <a:defRPr sz="2844">
                 <a:solidFill>
                   <a:schemeClr val="tx1">
                     <a:tint val="75000"/>
@@ -1069,9 +944,9 @@
                 </a:solidFill>
               </a:defRPr>
             </a:lvl4pPr>
-            <a:lvl5pPr marL="1828800" indent="0">
-              <a:buNone/>
-              <a:defRPr sz="1600">
+            <a:lvl5pPr marL="3251241" indent="0">
+              <a:buNone/>
+              <a:defRPr sz="2844">
                 <a:solidFill>
                   <a:schemeClr val="tx1">
                     <a:tint val="75000"/>
@@ -1079,9 +954,9 @@
                 </a:solidFill>
               </a:defRPr>
             </a:lvl5pPr>
-            <a:lvl6pPr marL="2286000" indent="0">
-              <a:buNone/>
-              <a:defRPr sz="1600">
+            <a:lvl6pPr marL="4064051" indent="0">
+              <a:buNone/>
+              <a:defRPr sz="2844">
                 <a:solidFill>
                   <a:schemeClr val="tx1">
                     <a:tint val="75000"/>
@@ -1089,9 +964,9 @@
                 </a:solidFill>
               </a:defRPr>
             </a:lvl6pPr>
-            <a:lvl7pPr marL="2743200" indent="0">
-              <a:buNone/>
-              <a:defRPr sz="1600">
+            <a:lvl7pPr marL="4876861" indent="0">
+              <a:buNone/>
+              <a:defRPr sz="2844">
                 <a:solidFill>
                   <a:schemeClr val="tx1">
                     <a:tint val="75000"/>
@@ -1099,9 +974,9 @@
                 </a:solidFill>
               </a:defRPr>
             </a:lvl7pPr>
-            <a:lvl8pPr marL="3200400" indent="0">
-              <a:buNone/>
-              <a:defRPr sz="1600">
+            <a:lvl8pPr marL="5689671" indent="0">
+              <a:buNone/>
+              <a:defRPr sz="2844">
                 <a:solidFill>
                   <a:schemeClr val="tx1">
                     <a:tint val="75000"/>
@@ -1109,9 +984,9 @@
                 </a:solidFill>
               </a:defRPr>
             </a:lvl8pPr>
-            <a:lvl9pPr marL="3657600" indent="0">
-              <a:buNone/>
-              <a:defRPr sz="1600">
+            <a:lvl9pPr marL="6502481" indent="0">
+              <a:buNone/>
+              <a:defRPr sz="2844">
                 <a:solidFill>
                   <a:schemeClr val="tx1">
                     <a:tint val="75000"/>
@@ -1131,13 +1006,7 @@
       </p:sp>
       <p:sp>
         <p:nvSpPr>
-          <p:cNvPr id="4" name="Date Placeholder 3">
-            <a:extLst>
-              <a:ext uri="{FF2B5EF4-FFF2-40B4-BE49-F238E27FC236}">
-                <a16:creationId xmlns:a16="http://schemas.microsoft.com/office/drawing/2014/main" id="{C8D18043-2C19-9DDE-1EB2-1ADC8049B7E0}"/>
-              </a:ext>
-            </a:extLst>
-          </p:cNvPr>
+          <p:cNvPr id="4" name="Date Placeholder 3"/>
           <p:cNvSpPr>
             <a:spLocks noGrp="1"/>
           </p:cNvSpPr>
@@ -1160,13 +1029,7 @@
       </p:sp>
       <p:sp>
         <p:nvSpPr>
-          <p:cNvPr id="5" name="Footer Placeholder 4">
-            <a:extLst>
-              <a:ext uri="{FF2B5EF4-FFF2-40B4-BE49-F238E27FC236}">
-                <a16:creationId xmlns:a16="http://schemas.microsoft.com/office/drawing/2014/main" id="{50B82028-7EE5-6E61-D0BA-34D444655EAE}"/>
-              </a:ext>
-            </a:extLst>
-          </p:cNvPr>
+          <p:cNvPr id="5" name="Footer Placeholder 4"/>
           <p:cNvSpPr>
             <a:spLocks noGrp="1"/>
           </p:cNvSpPr>
@@ -1185,13 +1048,7 @@
       </p:sp>
       <p:sp>
         <p:nvSpPr>
-          <p:cNvPr id="6" name="Slide Number Placeholder 5">
-            <a:extLst>
-              <a:ext uri="{FF2B5EF4-FFF2-40B4-BE49-F238E27FC236}">
-                <a16:creationId xmlns:a16="http://schemas.microsoft.com/office/drawing/2014/main" id="{FC48AE52-A782-8E36-31DC-402CB79A566A}"/>
-              </a:ext>
-            </a:extLst>
-          </p:cNvPr>
+          <p:cNvPr id="6" name="Slide Number Placeholder 5"/>
           <p:cNvSpPr>
             <a:spLocks noGrp="1"/>
           </p:cNvSpPr>
@@ -1215,7 +1072,7 @@
     </p:spTree>
     <p:extLst>
       <p:ext uri="{BB962C8B-B14F-4D97-AF65-F5344CB8AC3E}">
-        <p14:creationId xmlns:p14="http://schemas.microsoft.com/office/powerpoint/2010/main" val="2336706617"/>
+        <p14:creationId xmlns:p14="http://schemas.microsoft.com/office/powerpoint/2010/main" val="2054635362"/>
       </p:ext>
     </p:extLst>
   </p:cSld>
@@ -1244,13 +1101,7 @@
       </p:grpSpPr>
       <p:sp>
         <p:nvSpPr>
-          <p:cNvPr id="2" name="Title 1">
-            <a:extLst>
-              <a:ext uri="{FF2B5EF4-FFF2-40B4-BE49-F238E27FC236}">
-                <a16:creationId xmlns:a16="http://schemas.microsoft.com/office/drawing/2014/main" id="{80099852-D4F1-8536-915E-93D84521A4B1}"/>
-              </a:ext>
-            </a:extLst>
-          </p:cNvPr>
+          <p:cNvPr id="2" name="Title 1"/>
           <p:cNvSpPr>
             <a:spLocks noGrp="1"/>
           </p:cNvSpPr>
@@ -1267,19 +1118,13 @@
               <a:rPr lang="en-GB"/>
               <a:t>Click to edit Master title style</a:t>
             </a:r>
-            <a:endParaRPr lang="ru-RU"/>
-          </a:p>
-        </p:txBody>
-      </p:sp>
-      <p:sp>
-        <p:nvSpPr>
-          <p:cNvPr id="3" name="Content Placeholder 2">
-            <a:extLst>
-              <a:ext uri="{FF2B5EF4-FFF2-40B4-BE49-F238E27FC236}">
-                <a16:creationId xmlns:a16="http://schemas.microsoft.com/office/drawing/2014/main" id="{705245B0-1F8F-AF5A-333F-C52511E6FE72}"/>
-              </a:ext>
-            </a:extLst>
-          </p:cNvPr>
+            <a:endParaRPr lang="en-US" dirty="0"/>
+          </a:p>
+        </p:txBody>
+      </p:sp>
+      <p:sp>
+        <p:nvSpPr>
+          <p:cNvPr id="3" name="Content Placeholder 2"/>
           <p:cNvSpPr>
             <a:spLocks noGrp="1"/>
           </p:cNvSpPr>
@@ -1289,8 +1134,8 @@
         </p:nvSpPr>
         <p:spPr>
           <a:xfrm>
-            <a:off x="838200" y="1825625"/>
-            <a:ext cx="5181600" cy="4351338"/>
+            <a:off x="1117600" y="3245556"/>
+            <a:ext cx="6908800" cy="7735712"/>
           </a:xfrm>
         </p:spPr>
         <p:txBody>
@@ -1330,19 +1175,13 @@
               <a:rPr lang="en-GB"/>
               <a:t>Fifth level</a:t>
             </a:r>
-            <a:endParaRPr lang="ru-RU"/>
-          </a:p>
-        </p:txBody>
-      </p:sp>
-      <p:sp>
-        <p:nvSpPr>
-          <p:cNvPr id="4" name="Content Placeholder 3">
-            <a:extLst>
-              <a:ext uri="{FF2B5EF4-FFF2-40B4-BE49-F238E27FC236}">
-                <a16:creationId xmlns:a16="http://schemas.microsoft.com/office/drawing/2014/main" id="{84D84E56-BE86-3DAE-7EA2-E26FB2E43230}"/>
-              </a:ext>
-            </a:extLst>
-          </p:cNvPr>
+            <a:endParaRPr lang="en-US" dirty="0"/>
+          </a:p>
+        </p:txBody>
+      </p:sp>
+      <p:sp>
+        <p:nvSpPr>
+          <p:cNvPr id="4" name="Content Placeholder 3"/>
           <p:cNvSpPr>
             <a:spLocks noGrp="1"/>
           </p:cNvSpPr>
@@ -1352,8 +1191,8 @@
         </p:nvSpPr>
         <p:spPr>
           <a:xfrm>
-            <a:off x="6172200" y="1825625"/>
-            <a:ext cx="5181600" cy="4351338"/>
+            <a:off x="8229600" y="3245556"/>
+            <a:ext cx="6908800" cy="7735712"/>
           </a:xfrm>
         </p:spPr>
         <p:txBody>
@@ -1393,19 +1232,13 @@
               <a:rPr lang="en-GB"/>
               <a:t>Fifth level</a:t>
             </a:r>
-            <a:endParaRPr lang="ru-RU"/>
-          </a:p>
-        </p:txBody>
-      </p:sp>
-      <p:sp>
-        <p:nvSpPr>
-          <p:cNvPr id="5" name="Date Placeholder 4">
-            <a:extLst>
-              <a:ext uri="{FF2B5EF4-FFF2-40B4-BE49-F238E27FC236}">
-                <a16:creationId xmlns:a16="http://schemas.microsoft.com/office/drawing/2014/main" id="{27F11885-ABA7-CB1D-07F3-C7B394E6EBB8}"/>
-              </a:ext>
-            </a:extLst>
-          </p:cNvPr>
+            <a:endParaRPr lang="en-US" dirty="0"/>
+          </a:p>
+        </p:txBody>
+      </p:sp>
+      <p:sp>
+        <p:nvSpPr>
+          <p:cNvPr id="5" name="Date Placeholder 4"/>
           <p:cNvSpPr>
             <a:spLocks noGrp="1"/>
           </p:cNvSpPr>
@@ -1428,13 +1261,7 @@
       </p:sp>
       <p:sp>
         <p:nvSpPr>
-          <p:cNvPr id="6" name="Footer Placeholder 5">
-            <a:extLst>
-              <a:ext uri="{FF2B5EF4-FFF2-40B4-BE49-F238E27FC236}">
-                <a16:creationId xmlns:a16="http://schemas.microsoft.com/office/drawing/2014/main" id="{3CE35479-543F-0F6E-C52A-6F5532451DA3}"/>
-              </a:ext>
-            </a:extLst>
-          </p:cNvPr>
+          <p:cNvPr id="6" name="Footer Placeholder 5"/>
           <p:cNvSpPr>
             <a:spLocks noGrp="1"/>
           </p:cNvSpPr>
@@ -1453,13 +1280,7 @@
       </p:sp>
       <p:sp>
         <p:nvSpPr>
-          <p:cNvPr id="7" name="Slide Number Placeholder 6">
-            <a:extLst>
-              <a:ext uri="{FF2B5EF4-FFF2-40B4-BE49-F238E27FC236}">
-                <a16:creationId xmlns:a16="http://schemas.microsoft.com/office/drawing/2014/main" id="{38E0F920-D529-9E81-3939-87EF3D6E7452}"/>
-              </a:ext>
-            </a:extLst>
-          </p:cNvPr>
+          <p:cNvPr id="7" name="Slide Number Placeholder 6"/>
           <p:cNvSpPr>
             <a:spLocks noGrp="1"/>
           </p:cNvSpPr>
@@ -1483,7 +1304,7 @@
     </p:spTree>
     <p:extLst>
       <p:ext uri="{BB962C8B-B14F-4D97-AF65-F5344CB8AC3E}">
-        <p14:creationId xmlns:p14="http://schemas.microsoft.com/office/powerpoint/2010/main" val="1282403981"/>
+        <p14:creationId xmlns:p14="http://schemas.microsoft.com/office/powerpoint/2010/main" val="825283065"/>
       </p:ext>
     </p:extLst>
   </p:cSld>
@@ -1512,13 +1333,7 @@
       </p:grpSpPr>
       <p:sp>
         <p:nvSpPr>
-          <p:cNvPr id="2" name="Title 1">
-            <a:extLst>
-              <a:ext uri="{FF2B5EF4-FFF2-40B4-BE49-F238E27FC236}">
-                <a16:creationId xmlns:a16="http://schemas.microsoft.com/office/drawing/2014/main" id="{6D01CD2B-D764-4D58-BD61-81C33B66CF7D}"/>
-              </a:ext>
-            </a:extLst>
-          </p:cNvPr>
+          <p:cNvPr id="2" name="Title 1"/>
           <p:cNvSpPr>
             <a:spLocks noGrp="1"/>
           </p:cNvSpPr>
@@ -1528,8 +1343,8 @@
         </p:nvSpPr>
         <p:spPr>
           <a:xfrm>
-            <a:off x="839788" y="365125"/>
-            <a:ext cx="10515600" cy="1325563"/>
+            <a:off x="1119717" y="649114"/>
+            <a:ext cx="14020800" cy="2356556"/>
           </a:xfrm>
         </p:spPr>
         <p:txBody>
@@ -1540,19 +1355,13 @@
               <a:rPr lang="en-GB"/>
               <a:t>Click to edit Master title style</a:t>
             </a:r>
-            <a:endParaRPr lang="ru-RU"/>
-          </a:p>
-        </p:txBody>
-      </p:sp>
-      <p:sp>
-        <p:nvSpPr>
-          <p:cNvPr id="3" name="Text Placeholder 2">
-            <a:extLst>
-              <a:ext uri="{FF2B5EF4-FFF2-40B4-BE49-F238E27FC236}">
-                <a16:creationId xmlns:a16="http://schemas.microsoft.com/office/drawing/2014/main" id="{7A18FC6A-E944-4F88-6853-18DEB248B607}"/>
-              </a:ext>
-            </a:extLst>
-          </p:cNvPr>
+            <a:endParaRPr lang="en-US" dirty="0"/>
+          </a:p>
+        </p:txBody>
+      </p:sp>
+      <p:sp>
+        <p:nvSpPr>
+          <p:cNvPr id="3" name="Text Placeholder 2"/>
           <p:cNvSpPr>
             <a:spLocks noGrp="1"/>
           </p:cNvSpPr>
@@ -1562,8 +1371,8 @@
         </p:nvSpPr>
         <p:spPr>
           <a:xfrm>
-            <a:off x="839788" y="1681163"/>
-            <a:ext cx="5157787" cy="823912"/>
+            <a:off x="1119719" y="2988734"/>
+            <a:ext cx="6877049" cy="1464732"/>
           </a:xfrm>
         </p:spPr>
         <p:txBody>
@@ -1571,39 +1380,39 @@
           <a:lstStyle>
             <a:lvl1pPr marL="0" indent="0">
               <a:buNone/>
-              <a:defRPr sz="2400" b="1"/>
+              <a:defRPr sz="4267" b="1"/>
             </a:lvl1pPr>
-            <a:lvl2pPr marL="457200" indent="0">
-              <a:buNone/>
-              <a:defRPr sz="2000" b="1"/>
+            <a:lvl2pPr marL="812810" indent="0">
+              <a:buNone/>
+              <a:defRPr sz="3556" b="1"/>
             </a:lvl2pPr>
-            <a:lvl3pPr marL="914400" indent="0">
-              <a:buNone/>
-              <a:defRPr sz="1800" b="1"/>
+            <a:lvl3pPr marL="1625620" indent="0">
+              <a:buNone/>
+              <a:defRPr sz="3200" b="1"/>
             </a:lvl3pPr>
-            <a:lvl4pPr marL="1371600" indent="0">
-              <a:buNone/>
-              <a:defRPr sz="1600" b="1"/>
+            <a:lvl4pPr marL="2438430" indent="0">
+              <a:buNone/>
+              <a:defRPr sz="2844" b="1"/>
             </a:lvl4pPr>
-            <a:lvl5pPr marL="1828800" indent="0">
-              <a:buNone/>
-              <a:defRPr sz="1600" b="1"/>
+            <a:lvl5pPr marL="3251241" indent="0">
+              <a:buNone/>
+              <a:defRPr sz="2844" b="1"/>
             </a:lvl5pPr>
-            <a:lvl6pPr marL="2286000" indent="0">
-              <a:buNone/>
-              <a:defRPr sz="1600" b="1"/>
+            <a:lvl6pPr marL="4064051" indent="0">
+              <a:buNone/>
+              <a:defRPr sz="2844" b="1"/>
             </a:lvl6pPr>
-            <a:lvl7pPr marL="2743200" indent="0">
-              <a:buNone/>
-              <a:defRPr sz="1600" b="1"/>
+            <a:lvl7pPr marL="4876861" indent="0">
+              <a:buNone/>
+              <a:defRPr sz="2844" b="1"/>
             </a:lvl7pPr>
-            <a:lvl8pPr marL="3200400" indent="0">
-              <a:buNone/>
-              <a:defRPr sz="1600" b="1"/>
+            <a:lvl8pPr marL="5689671" indent="0">
+              <a:buNone/>
+              <a:defRPr sz="2844" b="1"/>
             </a:lvl8pPr>
-            <a:lvl9pPr marL="3657600" indent="0">
-              <a:buNone/>
-              <a:defRPr sz="1600" b="1"/>
+            <a:lvl9pPr marL="6502481" indent="0">
+              <a:buNone/>
+              <a:defRPr sz="2844" b="1"/>
             </a:lvl9pPr>
           </a:lstStyle>
           <a:p>
@@ -1617,13 +1426,7 @@
       </p:sp>
       <p:sp>
         <p:nvSpPr>
-          <p:cNvPr id="4" name="Content Placeholder 3">
-            <a:extLst>
-              <a:ext uri="{FF2B5EF4-FFF2-40B4-BE49-F238E27FC236}">
-                <a16:creationId xmlns:a16="http://schemas.microsoft.com/office/drawing/2014/main" id="{70198CA7-F85F-081B-D8BA-94C31BCBE135}"/>
-              </a:ext>
-            </a:extLst>
-          </p:cNvPr>
+          <p:cNvPr id="4" name="Content Placeholder 3"/>
           <p:cNvSpPr>
             <a:spLocks noGrp="1"/>
           </p:cNvSpPr>
@@ -1633,8 +1436,8 @@
         </p:nvSpPr>
         <p:spPr>
           <a:xfrm>
-            <a:off x="839788" y="2505075"/>
-            <a:ext cx="5157787" cy="3684588"/>
+            <a:off x="1119719" y="4453467"/>
+            <a:ext cx="6877049" cy="6550379"/>
           </a:xfrm>
         </p:spPr>
         <p:txBody>
@@ -1674,19 +1477,13 @@
               <a:rPr lang="en-GB"/>
               <a:t>Fifth level</a:t>
             </a:r>
-            <a:endParaRPr lang="ru-RU"/>
-          </a:p>
-        </p:txBody>
-      </p:sp>
-      <p:sp>
-        <p:nvSpPr>
-          <p:cNvPr id="5" name="Text Placeholder 4">
-            <a:extLst>
-              <a:ext uri="{FF2B5EF4-FFF2-40B4-BE49-F238E27FC236}">
-                <a16:creationId xmlns:a16="http://schemas.microsoft.com/office/drawing/2014/main" id="{ED94B311-E948-01B2-B65E-3D21F009A594}"/>
-              </a:ext>
-            </a:extLst>
-          </p:cNvPr>
+            <a:endParaRPr lang="en-US" dirty="0"/>
+          </a:p>
+        </p:txBody>
+      </p:sp>
+      <p:sp>
+        <p:nvSpPr>
+          <p:cNvPr id="5" name="Text Placeholder 4"/>
           <p:cNvSpPr>
             <a:spLocks noGrp="1"/>
           </p:cNvSpPr>
@@ -1696,8 +1493,8 @@
         </p:nvSpPr>
         <p:spPr>
           <a:xfrm>
-            <a:off x="6172200" y="1681163"/>
-            <a:ext cx="5183188" cy="823912"/>
+            <a:off x="8229601" y="2988734"/>
+            <a:ext cx="6910917" cy="1464732"/>
           </a:xfrm>
         </p:spPr>
         <p:txBody>
@@ -1705,39 +1502,39 @@
           <a:lstStyle>
             <a:lvl1pPr marL="0" indent="0">
               <a:buNone/>
-              <a:defRPr sz="2400" b="1"/>
+              <a:defRPr sz="4267" b="1"/>
             </a:lvl1pPr>
-            <a:lvl2pPr marL="457200" indent="0">
-              <a:buNone/>
-              <a:defRPr sz="2000" b="1"/>
+            <a:lvl2pPr marL="812810" indent="0">
+              <a:buNone/>
+              <a:defRPr sz="3556" b="1"/>
             </a:lvl2pPr>
-            <a:lvl3pPr marL="914400" indent="0">
-              <a:buNone/>
-              <a:defRPr sz="1800" b="1"/>
+            <a:lvl3pPr marL="1625620" indent="0">
+              <a:buNone/>
+              <a:defRPr sz="3200" b="1"/>
             </a:lvl3pPr>
-            <a:lvl4pPr marL="1371600" indent="0">
-              <a:buNone/>
-              <a:defRPr sz="1600" b="1"/>
+            <a:lvl4pPr marL="2438430" indent="0">
+              <a:buNone/>
+              <a:defRPr sz="2844" b="1"/>
             </a:lvl4pPr>
-            <a:lvl5pPr marL="1828800" indent="0">
-              <a:buNone/>
-              <a:defRPr sz="1600" b="1"/>
+            <a:lvl5pPr marL="3251241" indent="0">
+              <a:buNone/>
+              <a:defRPr sz="2844" b="1"/>
             </a:lvl5pPr>
-            <a:lvl6pPr marL="2286000" indent="0">
-              <a:buNone/>
-              <a:defRPr sz="1600" b="1"/>
+            <a:lvl6pPr marL="4064051" indent="0">
+              <a:buNone/>
+              <a:defRPr sz="2844" b="1"/>
             </a:lvl6pPr>
-            <a:lvl7pPr marL="2743200" indent="0">
-              <a:buNone/>
-              <a:defRPr sz="1600" b="1"/>
+            <a:lvl7pPr marL="4876861" indent="0">
+              <a:buNone/>
+              <a:defRPr sz="2844" b="1"/>
             </a:lvl7pPr>
-            <a:lvl8pPr marL="3200400" indent="0">
-              <a:buNone/>
-              <a:defRPr sz="1600" b="1"/>
+            <a:lvl8pPr marL="5689671" indent="0">
+              <a:buNone/>
+              <a:defRPr sz="2844" b="1"/>
             </a:lvl8pPr>
-            <a:lvl9pPr marL="3657600" indent="0">
-              <a:buNone/>
-              <a:defRPr sz="1600" b="1"/>
+            <a:lvl9pPr marL="6502481" indent="0">
+              <a:buNone/>
+              <a:defRPr sz="2844" b="1"/>
             </a:lvl9pPr>
           </a:lstStyle>
           <a:p>
@@ -1751,13 +1548,7 @@
       </p:sp>
       <p:sp>
         <p:nvSpPr>
-          <p:cNvPr id="6" name="Content Placeholder 5">
-            <a:extLst>
-              <a:ext uri="{FF2B5EF4-FFF2-40B4-BE49-F238E27FC236}">
-                <a16:creationId xmlns:a16="http://schemas.microsoft.com/office/drawing/2014/main" id="{B5221671-0C94-8D9A-2768-6234BE216F12}"/>
-              </a:ext>
-            </a:extLst>
-          </p:cNvPr>
+          <p:cNvPr id="6" name="Content Placeholder 5"/>
           <p:cNvSpPr>
             <a:spLocks noGrp="1"/>
           </p:cNvSpPr>
@@ -1767,8 +1558,8 @@
         </p:nvSpPr>
         <p:spPr>
           <a:xfrm>
-            <a:off x="6172200" y="2505075"/>
-            <a:ext cx="5183188" cy="3684588"/>
+            <a:off x="8229601" y="4453467"/>
+            <a:ext cx="6910917" cy="6550379"/>
           </a:xfrm>
         </p:spPr>
         <p:txBody>
@@ -1808,19 +1599,13 @@
               <a:rPr lang="en-GB"/>
               <a:t>Fifth level</a:t>
             </a:r>
-            <a:endParaRPr lang="ru-RU"/>
-          </a:p>
-        </p:txBody>
-      </p:sp>
-      <p:sp>
-        <p:nvSpPr>
-          <p:cNvPr id="7" name="Date Placeholder 6">
-            <a:extLst>
-              <a:ext uri="{FF2B5EF4-FFF2-40B4-BE49-F238E27FC236}">
-                <a16:creationId xmlns:a16="http://schemas.microsoft.com/office/drawing/2014/main" id="{1054EEBF-5367-8401-3F56-1BF6CE866CC9}"/>
-              </a:ext>
-            </a:extLst>
-          </p:cNvPr>
+            <a:endParaRPr lang="en-US" dirty="0"/>
+          </a:p>
+        </p:txBody>
+      </p:sp>
+      <p:sp>
+        <p:nvSpPr>
+          <p:cNvPr id="7" name="Date Placeholder 6"/>
           <p:cNvSpPr>
             <a:spLocks noGrp="1"/>
           </p:cNvSpPr>
@@ -1843,13 +1628,7 @@
       </p:sp>
       <p:sp>
         <p:nvSpPr>
-          <p:cNvPr id="8" name="Footer Placeholder 7">
-            <a:extLst>
-              <a:ext uri="{FF2B5EF4-FFF2-40B4-BE49-F238E27FC236}">
-                <a16:creationId xmlns:a16="http://schemas.microsoft.com/office/drawing/2014/main" id="{14748AEB-191B-69DC-456C-41FFB6298812}"/>
-              </a:ext>
-            </a:extLst>
-          </p:cNvPr>
+          <p:cNvPr id="8" name="Footer Placeholder 7"/>
           <p:cNvSpPr>
             <a:spLocks noGrp="1"/>
           </p:cNvSpPr>
@@ -1868,13 +1647,7 @@
       </p:sp>
       <p:sp>
         <p:nvSpPr>
-          <p:cNvPr id="9" name="Slide Number Placeholder 8">
-            <a:extLst>
-              <a:ext uri="{FF2B5EF4-FFF2-40B4-BE49-F238E27FC236}">
-                <a16:creationId xmlns:a16="http://schemas.microsoft.com/office/drawing/2014/main" id="{FB36C144-4492-C7EA-CD14-7C07E489CDCC}"/>
-              </a:ext>
-            </a:extLst>
-          </p:cNvPr>
+          <p:cNvPr id="9" name="Slide Number Placeholder 8"/>
           <p:cNvSpPr>
             <a:spLocks noGrp="1"/>
           </p:cNvSpPr>
@@ -1898,7 +1671,7 @@
     </p:spTree>
     <p:extLst>
       <p:ext uri="{BB962C8B-B14F-4D97-AF65-F5344CB8AC3E}">
-        <p14:creationId xmlns:p14="http://schemas.microsoft.com/office/powerpoint/2010/main" val="3142877871"/>
+        <p14:creationId xmlns:p14="http://schemas.microsoft.com/office/powerpoint/2010/main" val="3953627847"/>
       </p:ext>
     </p:extLst>
   </p:cSld>
@@ -1927,13 +1700,7 @@
       </p:grpSpPr>
       <p:sp>
         <p:nvSpPr>
-          <p:cNvPr id="2" name="Title 1">
-            <a:extLst>
-              <a:ext uri="{FF2B5EF4-FFF2-40B4-BE49-F238E27FC236}">
-                <a16:creationId xmlns:a16="http://schemas.microsoft.com/office/drawing/2014/main" id="{E7794259-7090-0129-2BA9-000CFC040527}"/>
-              </a:ext>
-            </a:extLst>
-          </p:cNvPr>
+          <p:cNvPr id="2" name="Title 1"/>
           <p:cNvSpPr>
             <a:spLocks noGrp="1"/>
           </p:cNvSpPr>
@@ -1950,19 +1717,13 @@
               <a:rPr lang="en-GB"/>
               <a:t>Click to edit Master title style</a:t>
             </a:r>
-            <a:endParaRPr lang="ru-RU"/>
-          </a:p>
-        </p:txBody>
-      </p:sp>
-      <p:sp>
-        <p:nvSpPr>
-          <p:cNvPr id="3" name="Date Placeholder 2">
-            <a:extLst>
-              <a:ext uri="{FF2B5EF4-FFF2-40B4-BE49-F238E27FC236}">
-                <a16:creationId xmlns:a16="http://schemas.microsoft.com/office/drawing/2014/main" id="{9381DA6C-FAF4-9B5F-D972-563EDFBEAFCE}"/>
-              </a:ext>
-            </a:extLst>
-          </p:cNvPr>
+            <a:endParaRPr lang="en-US" dirty="0"/>
+          </a:p>
+        </p:txBody>
+      </p:sp>
+      <p:sp>
+        <p:nvSpPr>
+          <p:cNvPr id="3" name="Date Placeholder 2"/>
           <p:cNvSpPr>
             <a:spLocks noGrp="1"/>
           </p:cNvSpPr>
@@ -1985,13 +1746,7 @@
       </p:sp>
       <p:sp>
         <p:nvSpPr>
-          <p:cNvPr id="4" name="Footer Placeholder 3">
-            <a:extLst>
-              <a:ext uri="{FF2B5EF4-FFF2-40B4-BE49-F238E27FC236}">
-                <a16:creationId xmlns:a16="http://schemas.microsoft.com/office/drawing/2014/main" id="{F7F915BB-54F6-25F6-D112-CAB874841D19}"/>
-              </a:ext>
-            </a:extLst>
-          </p:cNvPr>
+          <p:cNvPr id="4" name="Footer Placeholder 3"/>
           <p:cNvSpPr>
             <a:spLocks noGrp="1"/>
           </p:cNvSpPr>
@@ -2010,13 +1765,7 @@
       </p:sp>
       <p:sp>
         <p:nvSpPr>
-          <p:cNvPr id="5" name="Slide Number Placeholder 4">
-            <a:extLst>
-              <a:ext uri="{FF2B5EF4-FFF2-40B4-BE49-F238E27FC236}">
-                <a16:creationId xmlns:a16="http://schemas.microsoft.com/office/drawing/2014/main" id="{C4CE74C3-0548-B742-9866-59C5546B5705}"/>
-              </a:ext>
-            </a:extLst>
-          </p:cNvPr>
+          <p:cNvPr id="5" name="Slide Number Placeholder 4"/>
           <p:cNvSpPr>
             <a:spLocks noGrp="1"/>
           </p:cNvSpPr>
@@ -2040,7 +1789,7 @@
     </p:spTree>
     <p:extLst>
       <p:ext uri="{BB962C8B-B14F-4D97-AF65-F5344CB8AC3E}">
-        <p14:creationId xmlns:p14="http://schemas.microsoft.com/office/powerpoint/2010/main" val="1051345365"/>
+        <p14:creationId xmlns:p14="http://schemas.microsoft.com/office/powerpoint/2010/main" val="2232543147"/>
       </p:ext>
     </p:extLst>
   </p:cSld>
@@ -2069,13 +1818,7 @@
       </p:grpSpPr>
       <p:sp>
         <p:nvSpPr>
-          <p:cNvPr id="2" name="Date Placeholder 1">
-            <a:extLst>
-              <a:ext uri="{FF2B5EF4-FFF2-40B4-BE49-F238E27FC236}">
-                <a16:creationId xmlns:a16="http://schemas.microsoft.com/office/drawing/2014/main" id="{DC3D638F-A164-4334-987F-19B30C6DC70D}"/>
-              </a:ext>
-            </a:extLst>
-          </p:cNvPr>
+          <p:cNvPr id="2" name="Date Placeholder 1"/>
           <p:cNvSpPr>
             <a:spLocks noGrp="1"/>
           </p:cNvSpPr>
@@ -2098,13 +1841,7 @@
       </p:sp>
       <p:sp>
         <p:nvSpPr>
-          <p:cNvPr id="3" name="Footer Placeholder 2">
-            <a:extLst>
-              <a:ext uri="{FF2B5EF4-FFF2-40B4-BE49-F238E27FC236}">
-                <a16:creationId xmlns:a16="http://schemas.microsoft.com/office/drawing/2014/main" id="{CC895D71-6B25-DDA3-B16B-9B6B5A5CB906}"/>
-              </a:ext>
-            </a:extLst>
-          </p:cNvPr>
+          <p:cNvPr id="3" name="Footer Placeholder 2"/>
           <p:cNvSpPr>
             <a:spLocks noGrp="1"/>
           </p:cNvSpPr>
@@ -2123,13 +1860,7 @@
       </p:sp>
       <p:sp>
         <p:nvSpPr>
-          <p:cNvPr id="4" name="Slide Number Placeholder 3">
-            <a:extLst>
-              <a:ext uri="{FF2B5EF4-FFF2-40B4-BE49-F238E27FC236}">
-                <a16:creationId xmlns:a16="http://schemas.microsoft.com/office/drawing/2014/main" id="{4CAB98FF-00CF-7110-97C9-0D840614309F}"/>
-              </a:ext>
-            </a:extLst>
-          </p:cNvPr>
+          <p:cNvPr id="4" name="Slide Number Placeholder 3"/>
           <p:cNvSpPr>
             <a:spLocks noGrp="1"/>
           </p:cNvSpPr>
@@ -2153,7 +1884,7 @@
     </p:spTree>
     <p:extLst>
       <p:ext uri="{BB962C8B-B14F-4D97-AF65-F5344CB8AC3E}">
-        <p14:creationId xmlns:p14="http://schemas.microsoft.com/office/powerpoint/2010/main" val="2076127052"/>
+        <p14:creationId xmlns:p14="http://schemas.microsoft.com/office/powerpoint/2010/main" val="3609364740"/>
       </p:ext>
     </p:extLst>
   </p:cSld>
@@ -2182,13 +1913,7 @@
       </p:grpSpPr>
       <p:sp>
         <p:nvSpPr>
-          <p:cNvPr id="2" name="Title 1">
-            <a:extLst>
-              <a:ext uri="{FF2B5EF4-FFF2-40B4-BE49-F238E27FC236}">
-                <a16:creationId xmlns:a16="http://schemas.microsoft.com/office/drawing/2014/main" id="{BA3BA704-01B8-1993-C402-AB711D81880E}"/>
-              </a:ext>
-            </a:extLst>
-          </p:cNvPr>
+          <p:cNvPr id="2" name="Title 1"/>
           <p:cNvSpPr>
             <a:spLocks noGrp="1"/>
           </p:cNvSpPr>
@@ -2198,15 +1923,15 @@
         </p:nvSpPr>
         <p:spPr>
           <a:xfrm>
-            <a:off x="839788" y="457200"/>
-            <a:ext cx="3932237" cy="1600200"/>
+            <a:off x="1119717" y="812800"/>
+            <a:ext cx="5242983" cy="2844800"/>
           </a:xfrm>
         </p:spPr>
         <p:txBody>
           <a:bodyPr anchor="b"/>
           <a:lstStyle>
             <a:lvl1pPr>
-              <a:defRPr sz="3200"/>
+              <a:defRPr sz="5689"/>
             </a:lvl1pPr>
           </a:lstStyle>
           <a:p>
@@ -2214,19 +1939,13 @@
               <a:rPr lang="en-GB"/>
               <a:t>Click to edit Master title style</a:t>
             </a:r>
-            <a:endParaRPr lang="ru-RU"/>
-          </a:p>
-        </p:txBody>
-      </p:sp>
-      <p:sp>
-        <p:nvSpPr>
-          <p:cNvPr id="3" name="Content Placeholder 2">
-            <a:extLst>
-              <a:ext uri="{FF2B5EF4-FFF2-40B4-BE49-F238E27FC236}">
-                <a16:creationId xmlns:a16="http://schemas.microsoft.com/office/drawing/2014/main" id="{F0BEA97E-EC30-F8B7-6DB0-A71279118061}"/>
-              </a:ext>
-            </a:extLst>
-          </p:cNvPr>
+            <a:endParaRPr lang="en-US" dirty="0"/>
+          </a:p>
+        </p:txBody>
+      </p:sp>
+      <p:sp>
+        <p:nvSpPr>
+          <p:cNvPr id="3" name="Content Placeholder 2"/>
           <p:cNvSpPr>
             <a:spLocks noGrp="1"/>
           </p:cNvSpPr>
@@ -2236,39 +1955,39 @@
         </p:nvSpPr>
         <p:spPr>
           <a:xfrm>
-            <a:off x="5183188" y="987425"/>
-            <a:ext cx="6172200" cy="4873625"/>
+            <a:off x="6910917" y="1755425"/>
+            <a:ext cx="8229600" cy="8664222"/>
           </a:xfrm>
         </p:spPr>
         <p:txBody>
           <a:bodyPr/>
           <a:lstStyle>
             <a:lvl1pPr>
-              <a:defRPr sz="3200"/>
+              <a:defRPr sz="5689"/>
             </a:lvl1pPr>
             <a:lvl2pPr>
-              <a:defRPr sz="2800"/>
+              <a:defRPr sz="4978"/>
             </a:lvl2pPr>
             <a:lvl3pPr>
-              <a:defRPr sz="2400"/>
+              <a:defRPr sz="4267"/>
             </a:lvl3pPr>
             <a:lvl4pPr>
-              <a:defRPr sz="2000"/>
+              <a:defRPr sz="3556"/>
             </a:lvl4pPr>
             <a:lvl5pPr>
-              <a:defRPr sz="2000"/>
+              <a:defRPr sz="3556"/>
             </a:lvl5pPr>
             <a:lvl6pPr>
-              <a:defRPr sz="2000"/>
+              <a:defRPr sz="3556"/>
             </a:lvl6pPr>
             <a:lvl7pPr>
-              <a:defRPr sz="2000"/>
+              <a:defRPr sz="3556"/>
             </a:lvl7pPr>
             <a:lvl8pPr>
-              <a:defRPr sz="2000"/>
+              <a:defRPr sz="3556"/>
             </a:lvl8pPr>
             <a:lvl9pPr>
-              <a:defRPr sz="2000"/>
+              <a:defRPr sz="3556"/>
             </a:lvl9pPr>
           </a:lstStyle>
           <a:p>
@@ -2305,19 +2024,13 @@
               <a:rPr lang="en-GB"/>
               <a:t>Fifth level</a:t>
             </a:r>
-            <a:endParaRPr lang="ru-RU"/>
-          </a:p>
-        </p:txBody>
-      </p:sp>
-      <p:sp>
-        <p:nvSpPr>
-          <p:cNvPr id="4" name="Text Placeholder 3">
-            <a:extLst>
-              <a:ext uri="{FF2B5EF4-FFF2-40B4-BE49-F238E27FC236}">
-                <a16:creationId xmlns:a16="http://schemas.microsoft.com/office/drawing/2014/main" id="{CA920FB4-F0F1-3589-EC81-DCFAEFAECFE3}"/>
-              </a:ext>
-            </a:extLst>
-          </p:cNvPr>
+            <a:endParaRPr lang="en-US" dirty="0"/>
+          </a:p>
+        </p:txBody>
+      </p:sp>
+      <p:sp>
+        <p:nvSpPr>
+          <p:cNvPr id="4" name="Text Placeholder 3"/>
           <p:cNvSpPr>
             <a:spLocks noGrp="1"/>
           </p:cNvSpPr>
@@ -2327,8 +2040,8 @@
         </p:nvSpPr>
         <p:spPr>
           <a:xfrm>
-            <a:off x="839788" y="2057400"/>
-            <a:ext cx="3932237" cy="3811588"/>
+            <a:off x="1119717" y="3657600"/>
+            <a:ext cx="5242983" cy="6776156"/>
           </a:xfrm>
         </p:spPr>
         <p:txBody>
@@ -2336,39 +2049,39 @@
           <a:lstStyle>
             <a:lvl1pPr marL="0" indent="0">
               <a:buNone/>
-              <a:defRPr sz="1600"/>
+              <a:defRPr sz="2844"/>
             </a:lvl1pPr>
-            <a:lvl2pPr marL="457200" indent="0">
-              <a:buNone/>
-              <a:defRPr sz="1400"/>
+            <a:lvl2pPr marL="812810" indent="0">
+              <a:buNone/>
+              <a:defRPr sz="2489"/>
             </a:lvl2pPr>
-            <a:lvl3pPr marL="914400" indent="0">
-              <a:buNone/>
-              <a:defRPr sz="1200"/>
+            <a:lvl3pPr marL="1625620" indent="0">
+              <a:buNone/>
+              <a:defRPr sz="2133"/>
             </a:lvl3pPr>
-            <a:lvl4pPr marL="1371600" indent="0">
-              <a:buNone/>
-              <a:defRPr sz="1000"/>
+            <a:lvl4pPr marL="2438430" indent="0">
+              <a:buNone/>
+              <a:defRPr sz="1778"/>
             </a:lvl4pPr>
-            <a:lvl5pPr marL="1828800" indent="0">
-              <a:buNone/>
-              <a:defRPr sz="1000"/>
+            <a:lvl5pPr marL="3251241" indent="0">
+              <a:buNone/>
+              <a:defRPr sz="1778"/>
             </a:lvl5pPr>
-            <a:lvl6pPr marL="2286000" indent="0">
-              <a:buNone/>
-              <a:defRPr sz="1000"/>
+            <a:lvl6pPr marL="4064051" indent="0">
+              <a:buNone/>
+              <a:defRPr sz="1778"/>
             </a:lvl6pPr>
-            <a:lvl7pPr marL="2743200" indent="0">
-              <a:buNone/>
-              <a:defRPr sz="1000"/>
+            <a:lvl7pPr marL="4876861" indent="0">
+              <a:buNone/>
+              <a:defRPr sz="1778"/>
             </a:lvl7pPr>
-            <a:lvl8pPr marL="3200400" indent="0">
-              <a:buNone/>
-              <a:defRPr sz="1000"/>
+            <a:lvl8pPr marL="5689671" indent="0">
+              <a:buNone/>
+              <a:defRPr sz="1778"/>
             </a:lvl8pPr>
-            <a:lvl9pPr marL="3657600" indent="0">
-              <a:buNone/>
-              <a:defRPr sz="1000"/>
+            <a:lvl9pPr marL="6502481" indent="0">
+              <a:buNone/>
+              <a:defRPr sz="1778"/>
             </a:lvl9pPr>
           </a:lstStyle>
           <a:p>
@@ -2382,13 +2095,7 @@
       </p:sp>
       <p:sp>
         <p:nvSpPr>
-          <p:cNvPr id="5" name="Date Placeholder 4">
-            <a:extLst>
-              <a:ext uri="{FF2B5EF4-FFF2-40B4-BE49-F238E27FC236}">
-                <a16:creationId xmlns:a16="http://schemas.microsoft.com/office/drawing/2014/main" id="{3EB7AE25-64B3-B2EB-515A-4B288A325026}"/>
-              </a:ext>
-            </a:extLst>
-          </p:cNvPr>
+          <p:cNvPr id="5" name="Date Placeholder 4"/>
           <p:cNvSpPr>
             <a:spLocks noGrp="1"/>
           </p:cNvSpPr>
@@ -2411,13 +2118,7 @@
       </p:sp>
       <p:sp>
         <p:nvSpPr>
-          <p:cNvPr id="6" name="Footer Placeholder 5">
-            <a:extLst>
-              <a:ext uri="{FF2B5EF4-FFF2-40B4-BE49-F238E27FC236}">
-                <a16:creationId xmlns:a16="http://schemas.microsoft.com/office/drawing/2014/main" id="{90106087-04B4-1429-44AD-16168118C32E}"/>
-              </a:ext>
-            </a:extLst>
-          </p:cNvPr>
+          <p:cNvPr id="6" name="Footer Placeholder 5"/>
           <p:cNvSpPr>
             <a:spLocks noGrp="1"/>
           </p:cNvSpPr>
@@ -2436,13 +2137,7 @@
       </p:sp>
       <p:sp>
         <p:nvSpPr>
-          <p:cNvPr id="7" name="Slide Number Placeholder 6">
-            <a:extLst>
-              <a:ext uri="{FF2B5EF4-FFF2-40B4-BE49-F238E27FC236}">
-                <a16:creationId xmlns:a16="http://schemas.microsoft.com/office/drawing/2014/main" id="{57AAD60C-DC6D-05F2-3E9C-E8711C4EA40C}"/>
-              </a:ext>
-            </a:extLst>
-          </p:cNvPr>
+          <p:cNvPr id="7" name="Slide Number Placeholder 6"/>
           <p:cNvSpPr>
             <a:spLocks noGrp="1"/>
           </p:cNvSpPr>
@@ -2466,7 +2161,7 @@
     </p:spTree>
     <p:extLst>
       <p:ext uri="{BB962C8B-B14F-4D97-AF65-F5344CB8AC3E}">
-        <p14:creationId xmlns:p14="http://schemas.microsoft.com/office/powerpoint/2010/main" val="2886220705"/>
+        <p14:creationId xmlns:p14="http://schemas.microsoft.com/office/powerpoint/2010/main" val="3472679704"/>
       </p:ext>
     </p:extLst>
   </p:cSld>
@@ -2495,13 +2190,7 @@
       </p:grpSpPr>
       <p:sp>
         <p:nvSpPr>
-          <p:cNvPr id="2" name="Title 1">
-            <a:extLst>
-              <a:ext uri="{FF2B5EF4-FFF2-40B4-BE49-F238E27FC236}">
-                <a16:creationId xmlns:a16="http://schemas.microsoft.com/office/drawing/2014/main" id="{313DC756-0FE8-A197-122B-253461C523FA}"/>
-              </a:ext>
-            </a:extLst>
-          </p:cNvPr>
+          <p:cNvPr id="2" name="Title 1"/>
           <p:cNvSpPr>
             <a:spLocks noGrp="1"/>
           </p:cNvSpPr>
@@ -2511,15 +2200,15 @@
         </p:nvSpPr>
         <p:spPr>
           <a:xfrm>
-            <a:off x="839788" y="457200"/>
-            <a:ext cx="3932237" cy="1600200"/>
+            <a:off x="1119717" y="812800"/>
+            <a:ext cx="5242983" cy="2844800"/>
           </a:xfrm>
         </p:spPr>
         <p:txBody>
           <a:bodyPr anchor="b"/>
           <a:lstStyle>
             <a:lvl1pPr>
-              <a:defRPr sz="3200"/>
+              <a:defRPr sz="5689"/>
             </a:lvl1pPr>
           </a:lstStyle>
           <a:p>
@@ -2527,21 +2216,15 @@
               <a:rPr lang="en-GB"/>
               <a:t>Click to edit Master title style</a:t>
             </a:r>
-            <a:endParaRPr lang="ru-RU"/>
-          </a:p>
-        </p:txBody>
-      </p:sp>
-      <p:sp>
-        <p:nvSpPr>
-          <p:cNvPr id="3" name="Picture Placeholder 2">
-            <a:extLst>
-              <a:ext uri="{FF2B5EF4-FFF2-40B4-BE49-F238E27FC236}">
-                <a16:creationId xmlns:a16="http://schemas.microsoft.com/office/drawing/2014/main" id="{725604A8-00EB-0A49-8560-6FF4001C9528}"/>
-              </a:ext>
-            </a:extLst>
-          </p:cNvPr>
-          <p:cNvSpPr>
-            <a:spLocks noGrp="1"/>
+            <a:endParaRPr lang="en-US" dirty="0"/>
+          </a:p>
+        </p:txBody>
+      </p:sp>
+      <p:sp>
+        <p:nvSpPr>
+          <p:cNvPr id="3" name="Picture Placeholder 2"/>
+          <p:cNvSpPr>
+            <a:spLocks noGrp="1" noChangeAspect="1"/>
           </p:cNvSpPr>
           <p:nvPr>
             <p:ph type="pic" idx="1"/>
@@ -2549,64 +2232,62 @@
         </p:nvSpPr>
         <p:spPr>
           <a:xfrm>
-            <a:off x="5183188" y="987425"/>
-            <a:ext cx="6172200" cy="4873625"/>
+            <a:off x="6910917" y="1755425"/>
+            <a:ext cx="8229600" cy="8664222"/>
           </a:xfrm>
         </p:spPr>
         <p:txBody>
-          <a:bodyPr/>
+          <a:bodyPr anchor="t"/>
           <a:lstStyle>
             <a:lvl1pPr marL="0" indent="0">
               <a:buNone/>
-              <a:defRPr sz="3200"/>
+              <a:defRPr sz="5689"/>
             </a:lvl1pPr>
-            <a:lvl2pPr marL="457200" indent="0">
-              <a:buNone/>
-              <a:defRPr sz="2800"/>
+            <a:lvl2pPr marL="812810" indent="0">
+              <a:buNone/>
+              <a:defRPr sz="4978"/>
             </a:lvl2pPr>
-            <a:lvl3pPr marL="914400" indent="0">
-              <a:buNone/>
-              <a:defRPr sz="2400"/>
+            <a:lvl3pPr marL="1625620" indent="0">
+              <a:buNone/>
+              <a:defRPr sz="4267"/>
             </a:lvl3pPr>
-            <a:lvl4pPr marL="1371600" indent="0">
-              <a:buNone/>
-              <a:defRPr sz="2000"/>
+            <a:lvl4pPr marL="2438430" indent="0">
+              <a:buNone/>
+              <a:defRPr sz="3556"/>
             </a:lvl4pPr>
-            <a:lvl5pPr marL="1828800" indent="0">
-              <a:buNone/>
-              <a:defRPr sz="2000"/>
+            <a:lvl5pPr marL="3251241" indent="0">
+              <a:buNone/>
+              <a:defRPr sz="3556"/>
             </a:lvl5pPr>
-            <a:lvl6pPr marL="2286000" indent="0">
-              <a:buNone/>
-              <a:defRPr sz="2000"/>
+            <a:lvl6pPr marL="4064051" indent="0">
+              <a:buNone/>
+              <a:defRPr sz="3556"/>
             </a:lvl6pPr>
-            <a:lvl7pPr marL="2743200" indent="0">
-              <a:buNone/>
-              <a:defRPr sz="2000"/>
+            <a:lvl7pPr marL="4876861" indent="0">
+              <a:buNone/>
+              <a:defRPr sz="3556"/>
             </a:lvl7pPr>
-            <a:lvl8pPr marL="3200400" indent="0">
-              <a:buNone/>
-              <a:defRPr sz="2000"/>
+            <a:lvl8pPr marL="5689671" indent="0">
+              <a:buNone/>
+              <a:defRPr sz="3556"/>
             </a:lvl8pPr>
-            <a:lvl9pPr marL="3657600" indent="0">
-              <a:buNone/>
-              <a:defRPr sz="2000"/>
+            <a:lvl9pPr marL="6502481" indent="0">
+              <a:buNone/>
+              <a:defRPr sz="3556"/>
             </a:lvl9pPr>
           </a:lstStyle>
           <a:p>
-            <a:endParaRPr lang="ru-RU"/>
-          </a:p>
-        </p:txBody>
-      </p:sp>
-      <p:sp>
-        <p:nvSpPr>
-          <p:cNvPr id="4" name="Text Placeholder 3">
-            <a:extLst>
-              <a:ext uri="{FF2B5EF4-FFF2-40B4-BE49-F238E27FC236}">
-                <a16:creationId xmlns:a16="http://schemas.microsoft.com/office/drawing/2014/main" id="{6C613386-E181-A7E7-1789-9149E8BBCB7B}"/>
-              </a:ext>
-            </a:extLst>
-          </p:cNvPr>
+            <a:r>
+              <a:rPr lang="en-GB"/>
+              <a:t>Click icon to add picture</a:t>
+            </a:r>
+            <a:endParaRPr lang="en-US" dirty="0"/>
+          </a:p>
+        </p:txBody>
+      </p:sp>
+      <p:sp>
+        <p:nvSpPr>
+          <p:cNvPr id="4" name="Text Placeholder 3"/>
           <p:cNvSpPr>
             <a:spLocks noGrp="1"/>
           </p:cNvSpPr>
@@ -2616,8 +2297,8 @@
         </p:nvSpPr>
         <p:spPr>
           <a:xfrm>
-            <a:off x="839788" y="2057400"/>
-            <a:ext cx="3932237" cy="3811588"/>
+            <a:off x="1119717" y="3657600"/>
+            <a:ext cx="5242983" cy="6776156"/>
           </a:xfrm>
         </p:spPr>
         <p:txBody>
@@ -2625,39 +2306,39 @@
           <a:lstStyle>
             <a:lvl1pPr marL="0" indent="0">
               <a:buNone/>
-              <a:defRPr sz="1600"/>
+              <a:defRPr sz="2844"/>
             </a:lvl1pPr>
-            <a:lvl2pPr marL="457200" indent="0">
-              <a:buNone/>
-              <a:defRPr sz="1400"/>
+            <a:lvl2pPr marL="812810" indent="0">
+              <a:buNone/>
+              <a:defRPr sz="2489"/>
             </a:lvl2pPr>
-            <a:lvl3pPr marL="914400" indent="0">
-              <a:buNone/>
-              <a:defRPr sz="1200"/>
+            <a:lvl3pPr marL="1625620" indent="0">
+              <a:buNone/>
+              <a:defRPr sz="2133"/>
             </a:lvl3pPr>
-            <a:lvl4pPr marL="1371600" indent="0">
-              <a:buNone/>
-              <a:defRPr sz="1000"/>
+            <a:lvl4pPr marL="2438430" indent="0">
+              <a:buNone/>
+              <a:defRPr sz="1778"/>
             </a:lvl4pPr>
-            <a:lvl5pPr marL="1828800" indent="0">
-              <a:buNone/>
-              <a:defRPr sz="1000"/>
+            <a:lvl5pPr marL="3251241" indent="0">
+              <a:buNone/>
+              <a:defRPr sz="1778"/>
             </a:lvl5pPr>
-            <a:lvl6pPr marL="2286000" indent="0">
-              <a:buNone/>
-              <a:defRPr sz="1000"/>
+            <a:lvl6pPr marL="4064051" indent="0">
+              <a:buNone/>
+              <a:defRPr sz="1778"/>
             </a:lvl6pPr>
-            <a:lvl7pPr marL="2743200" indent="0">
-              <a:buNone/>
-              <a:defRPr sz="1000"/>
+            <a:lvl7pPr marL="4876861" indent="0">
+              <a:buNone/>
+              <a:defRPr sz="1778"/>
             </a:lvl7pPr>
-            <a:lvl8pPr marL="3200400" indent="0">
-              <a:buNone/>
-              <a:defRPr sz="1000"/>
+            <a:lvl8pPr marL="5689671" indent="0">
+              <a:buNone/>
+              <a:defRPr sz="1778"/>
             </a:lvl8pPr>
-            <a:lvl9pPr marL="3657600" indent="0">
-              <a:buNone/>
-              <a:defRPr sz="1000"/>
+            <a:lvl9pPr marL="6502481" indent="0">
+              <a:buNone/>
+              <a:defRPr sz="1778"/>
             </a:lvl9pPr>
           </a:lstStyle>
           <a:p>
@@ -2671,13 +2352,7 @@
       </p:sp>
       <p:sp>
         <p:nvSpPr>
-          <p:cNvPr id="5" name="Date Placeholder 4">
-            <a:extLst>
-              <a:ext uri="{FF2B5EF4-FFF2-40B4-BE49-F238E27FC236}">
-                <a16:creationId xmlns:a16="http://schemas.microsoft.com/office/drawing/2014/main" id="{EC7C0EFD-83EA-C6FD-0811-63C5B0DD951B}"/>
-              </a:ext>
-            </a:extLst>
-          </p:cNvPr>
+          <p:cNvPr id="5" name="Date Placeholder 4"/>
           <p:cNvSpPr>
             <a:spLocks noGrp="1"/>
           </p:cNvSpPr>
@@ -2700,13 +2375,7 @@
       </p:sp>
       <p:sp>
         <p:nvSpPr>
-          <p:cNvPr id="6" name="Footer Placeholder 5">
-            <a:extLst>
-              <a:ext uri="{FF2B5EF4-FFF2-40B4-BE49-F238E27FC236}">
-                <a16:creationId xmlns:a16="http://schemas.microsoft.com/office/drawing/2014/main" id="{022BB0B7-6BB3-3157-45FD-6722B30F9F9C}"/>
-              </a:ext>
-            </a:extLst>
-          </p:cNvPr>
+          <p:cNvPr id="6" name="Footer Placeholder 5"/>
           <p:cNvSpPr>
             <a:spLocks noGrp="1"/>
           </p:cNvSpPr>
@@ -2725,13 +2394,7 @@
       </p:sp>
       <p:sp>
         <p:nvSpPr>
-          <p:cNvPr id="7" name="Slide Number Placeholder 6">
-            <a:extLst>
-              <a:ext uri="{FF2B5EF4-FFF2-40B4-BE49-F238E27FC236}">
-                <a16:creationId xmlns:a16="http://schemas.microsoft.com/office/drawing/2014/main" id="{5998CDDD-C251-3AE6-2D81-4FBE71700FE9}"/>
-              </a:ext>
-            </a:extLst>
-          </p:cNvPr>
+          <p:cNvPr id="7" name="Slide Number Placeholder 6"/>
           <p:cNvSpPr>
             <a:spLocks noGrp="1"/>
           </p:cNvSpPr>
@@ -2755,7 +2418,7 @@
     </p:spTree>
     <p:extLst>
       <p:ext uri="{BB962C8B-B14F-4D97-AF65-F5344CB8AC3E}">
-        <p14:creationId xmlns:p14="http://schemas.microsoft.com/office/powerpoint/2010/main" val="3483452646"/>
+        <p14:creationId xmlns:p14="http://schemas.microsoft.com/office/powerpoint/2010/main" val="3773745598"/>
       </p:ext>
     </p:extLst>
   </p:cSld>
@@ -2789,13 +2452,7 @@
       </p:grpSpPr>
       <p:sp>
         <p:nvSpPr>
-          <p:cNvPr id="2" name="Title Placeholder 1">
-            <a:extLst>
-              <a:ext uri="{FF2B5EF4-FFF2-40B4-BE49-F238E27FC236}">
-                <a16:creationId xmlns:a16="http://schemas.microsoft.com/office/drawing/2014/main" id="{528F7304-6642-12D5-EB45-AC9AC917A64D}"/>
-              </a:ext>
-            </a:extLst>
-          </p:cNvPr>
+          <p:cNvPr id="2" name="Title Placeholder 1"/>
           <p:cNvSpPr>
             <a:spLocks noGrp="1"/>
           </p:cNvSpPr>
@@ -2805,8 +2462,8 @@
         </p:nvSpPr>
         <p:spPr>
           <a:xfrm>
-            <a:off x="838200" y="365125"/>
-            <a:ext cx="10515600" cy="1325563"/>
+            <a:off x="1117600" y="649114"/>
+            <a:ext cx="14020800" cy="2356556"/>
           </a:xfrm>
           <a:prstGeom prst="rect">
             <a:avLst/>
@@ -2822,19 +2479,13 @@
               <a:rPr lang="en-GB"/>
               <a:t>Click to edit Master title style</a:t>
             </a:r>
-            <a:endParaRPr lang="ru-RU"/>
-          </a:p>
-        </p:txBody>
-      </p:sp>
-      <p:sp>
-        <p:nvSpPr>
-          <p:cNvPr id="3" name="Text Placeholder 2">
-            <a:extLst>
-              <a:ext uri="{FF2B5EF4-FFF2-40B4-BE49-F238E27FC236}">
-                <a16:creationId xmlns:a16="http://schemas.microsoft.com/office/drawing/2014/main" id="{50522546-0A28-4AD1-09F2-9219E949842D}"/>
-              </a:ext>
-            </a:extLst>
-          </p:cNvPr>
+            <a:endParaRPr lang="en-US" dirty="0"/>
+          </a:p>
+        </p:txBody>
+      </p:sp>
+      <p:sp>
+        <p:nvSpPr>
+          <p:cNvPr id="3" name="Text Placeholder 2"/>
           <p:cNvSpPr>
             <a:spLocks noGrp="1"/>
           </p:cNvSpPr>
@@ -2844,8 +2495,8 @@
         </p:nvSpPr>
         <p:spPr>
           <a:xfrm>
-            <a:off x="838200" y="1825625"/>
-            <a:ext cx="10515600" cy="4351338"/>
+            <a:off x="1117600" y="3245556"/>
+            <a:ext cx="14020800" cy="7735712"/>
           </a:xfrm>
           <a:prstGeom prst="rect">
             <a:avLst/>
@@ -2890,19 +2541,13 @@
               <a:rPr lang="en-GB"/>
               <a:t>Fifth level</a:t>
             </a:r>
-            <a:endParaRPr lang="ru-RU"/>
-          </a:p>
-        </p:txBody>
-      </p:sp>
-      <p:sp>
-        <p:nvSpPr>
-          <p:cNvPr id="4" name="Date Placeholder 3">
-            <a:extLst>
-              <a:ext uri="{FF2B5EF4-FFF2-40B4-BE49-F238E27FC236}">
-                <a16:creationId xmlns:a16="http://schemas.microsoft.com/office/drawing/2014/main" id="{D9972128-6719-56FB-B45A-C3943C154CAA}"/>
-              </a:ext>
-            </a:extLst>
-          </p:cNvPr>
+            <a:endParaRPr lang="en-US" dirty="0"/>
+          </a:p>
+        </p:txBody>
+      </p:sp>
+      <p:sp>
+        <p:nvSpPr>
+          <p:cNvPr id="4" name="Date Placeholder 3"/>
           <p:cNvSpPr>
             <a:spLocks noGrp="1"/>
           </p:cNvSpPr>
@@ -2912,8 +2557,8 @@
         </p:nvSpPr>
         <p:spPr>
           <a:xfrm>
-            <a:off x="838200" y="6356350"/>
-            <a:ext cx="2743200" cy="365125"/>
+            <a:off x="1117600" y="11300181"/>
+            <a:ext cx="3657600" cy="649111"/>
           </a:xfrm>
           <a:prstGeom prst="rect">
             <a:avLst/>
@@ -2923,7 +2568,7 @@
           <a:bodyPr vert="horz" lIns="91440" tIns="45720" rIns="91440" bIns="45720" rtlCol="0" anchor="ctr"/>
           <a:lstStyle>
             <a:lvl1pPr algn="l">
-              <a:defRPr sz="1200">
+              <a:defRPr sz="2133">
                 <a:solidFill>
                   <a:schemeClr val="tx1">
                     <a:tint val="75000"/>
@@ -2943,13 +2588,7 @@
       </p:sp>
       <p:sp>
         <p:nvSpPr>
-          <p:cNvPr id="5" name="Footer Placeholder 4">
-            <a:extLst>
-              <a:ext uri="{FF2B5EF4-FFF2-40B4-BE49-F238E27FC236}">
-                <a16:creationId xmlns:a16="http://schemas.microsoft.com/office/drawing/2014/main" id="{BE8DA78C-96A5-633F-E110-E1233D2145A5}"/>
-              </a:ext>
-            </a:extLst>
-          </p:cNvPr>
+          <p:cNvPr id="5" name="Footer Placeholder 4"/>
           <p:cNvSpPr>
             <a:spLocks noGrp="1"/>
           </p:cNvSpPr>
@@ -2959,8 +2598,8 @@
         </p:nvSpPr>
         <p:spPr>
           <a:xfrm>
-            <a:off x="4038600" y="6356350"/>
-            <a:ext cx="4114800" cy="365125"/>
+            <a:off x="5384800" y="11300181"/>
+            <a:ext cx="5486400" cy="649111"/>
           </a:xfrm>
           <a:prstGeom prst="rect">
             <a:avLst/>
@@ -2970,7 +2609,7 @@
           <a:bodyPr vert="horz" lIns="91440" tIns="45720" rIns="91440" bIns="45720" rtlCol="0" anchor="ctr"/>
           <a:lstStyle>
             <a:lvl1pPr algn="ctr">
-              <a:defRPr sz="1200">
+              <a:defRPr sz="2133">
                 <a:solidFill>
                   <a:schemeClr val="tx1">
                     <a:tint val="75000"/>
@@ -2986,13 +2625,7 @@
       </p:sp>
       <p:sp>
         <p:nvSpPr>
-          <p:cNvPr id="6" name="Slide Number Placeholder 5">
-            <a:extLst>
-              <a:ext uri="{FF2B5EF4-FFF2-40B4-BE49-F238E27FC236}">
-                <a16:creationId xmlns:a16="http://schemas.microsoft.com/office/drawing/2014/main" id="{108CC11C-CEF5-96C1-5D1C-49B76FCC4A88}"/>
-              </a:ext>
-            </a:extLst>
-          </p:cNvPr>
+          <p:cNvPr id="6" name="Slide Number Placeholder 5"/>
           <p:cNvSpPr>
             <a:spLocks noGrp="1"/>
           </p:cNvSpPr>
@@ -3002,8 +2635,8 @@
         </p:nvSpPr>
         <p:spPr>
           <a:xfrm>
-            <a:off x="8610600" y="6356350"/>
-            <a:ext cx="2743200" cy="365125"/>
+            <a:off x="11480800" y="11300181"/>
+            <a:ext cx="3657600" cy="649111"/>
           </a:xfrm>
           <a:prstGeom prst="rect">
             <a:avLst/>
@@ -3013,7 +2646,7 @@
           <a:bodyPr vert="horz" lIns="91440" tIns="45720" rIns="91440" bIns="45720" rtlCol="0" anchor="ctr"/>
           <a:lstStyle>
             <a:lvl1pPr algn="r">
-              <a:defRPr sz="1200">
+              <a:defRPr sz="2133">
                 <a:solidFill>
                   <a:schemeClr val="tx1">
                     <a:tint val="75000"/>
@@ -3034,27 +2667,27 @@
     </p:spTree>
     <p:extLst>
       <p:ext uri="{BB962C8B-B14F-4D97-AF65-F5344CB8AC3E}">
-        <p14:creationId xmlns:p14="http://schemas.microsoft.com/office/powerpoint/2010/main" val="2033485884"/>
+        <p14:creationId xmlns:p14="http://schemas.microsoft.com/office/powerpoint/2010/main" val="3188615517"/>
       </p:ext>
     </p:extLst>
   </p:cSld>
   <p:clrMap bg1="lt1" tx1="dk1" bg2="lt2" tx2="dk2" accent1="accent1" accent2="accent2" accent3="accent3" accent4="accent4" accent5="accent5" accent6="accent6" hlink="hlink" folHlink="folHlink"/>
   <p:sldLayoutIdLst>
-    <p:sldLayoutId id="2147483649" r:id="rId1"/>
-    <p:sldLayoutId id="2147483650" r:id="rId2"/>
-    <p:sldLayoutId id="2147483651" r:id="rId3"/>
-    <p:sldLayoutId id="2147483652" r:id="rId4"/>
-    <p:sldLayoutId id="2147483653" r:id="rId5"/>
-    <p:sldLayoutId id="2147483654" r:id="rId6"/>
-    <p:sldLayoutId id="2147483655" r:id="rId7"/>
-    <p:sldLayoutId id="2147483656" r:id="rId8"/>
-    <p:sldLayoutId id="2147483657" r:id="rId9"/>
-    <p:sldLayoutId id="2147483658" r:id="rId10"/>
-    <p:sldLayoutId id="2147483659" r:id="rId11"/>
+    <p:sldLayoutId id="2147483697" r:id="rId1"/>
+    <p:sldLayoutId id="2147483698" r:id="rId2"/>
+    <p:sldLayoutId id="2147483699" r:id="rId3"/>
+    <p:sldLayoutId id="2147483700" r:id="rId4"/>
+    <p:sldLayoutId id="2147483701" r:id="rId5"/>
+    <p:sldLayoutId id="2147483702" r:id="rId6"/>
+    <p:sldLayoutId id="2147483703" r:id="rId7"/>
+    <p:sldLayoutId id="2147483704" r:id="rId8"/>
+    <p:sldLayoutId id="2147483705" r:id="rId9"/>
+    <p:sldLayoutId id="2147483706" r:id="rId10"/>
+    <p:sldLayoutId id="2147483707" r:id="rId11"/>
   </p:sldLayoutIdLst>
   <p:txStyles>
     <p:titleStyle>
-      <a:lvl1pPr algn="l" defTabSz="914400" rtl="0" eaLnBrk="1" latinLnBrk="0" hangingPunct="1">
+      <a:lvl1pPr algn="l" defTabSz="1625620" rtl="0" eaLnBrk="1" latinLnBrk="0" hangingPunct="1">
         <a:lnSpc>
           <a:spcPct val="90000"/>
         </a:lnSpc>
@@ -3062,7 +2695,7 @@
           <a:spcPct val="0"/>
         </a:spcBef>
         <a:buNone/>
-        <a:defRPr sz="4400" kern="1200">
+        <a:defRPr sz="7822" kern="1200">
           <a:solidFill>
             <a:schemeClr val="tx1"/>
           </a:solidFill>
@@ -3073,16 +2706,16 @@
       </a:lvl1pPr>
     </p:titleStyle>
     <p:bodyStyle>
-      <a:lvl1pPr marL="228600" indent="-228600" algn="l" defTabSz="914400" rtl="0" eaLnBrk="1" latinLnBrk="0" hangingPunct="1">
+      <a:lvl1pPr marL="406405" indent="-406405" algn="l" defTabSz="1625620" rtl="0" eaLnBrk="1" latinLnBrk="0" hangingPunct="1">
         <a:lnSpc>
           <a:spcPct val="90000"/>
         </a:lnSpc>
         <a:spcBef>
-          <a:spcPts val="1000"/>
+          <a:spcPts val="1778"/>
         </a:spcBef>
         <a:buFont typeface="Arial" panose="020B0604020202020204" pitchFamily="34" charset="0"/>
         <a:buChar char="•"/>
-        <a:defRPr sz="2800" kern="1200">
+        <a:defRPr sz="4978" kern="1200">
           <a:solidFill>
             <a:schemeClr val="tx1"/>
           </a:solidFill>
@@ -3091,16 +2724,16 @@
           <a:cs typeface="+mn-cs"/>
         </a:defRPr>
       </a:lvl1pPr>
-      <a:lvl2pPr marL="685800" indent="-228600" algn="l" defTabSz="914400" rtl="0" eaLnBrk="1" latinLnBrk="0" hangingPunct="1">
+      <a:lvl2pPr marL="1219215" indent="-406405" algn="l" defTabSz="1625620" rtl="0" eaLnBrk="1" latinLnBrk="0" hangingPunct="1">
         <a:lnSpc>
           <a:spcPct val="90000"/>
         </a:lnSpc>
         <a:spcBef>
-          <a:spcPts val="500"/>
+          <a:spcPts val="889"/>
         </a:spcBef>
         <a:buFont typeface="Arial" panose="020B0604020202020204" pitchFamily="34" charset="0"/>
         <a:buChar char="•"/>
-        <a:defRPr sz="2400" kern="1200">
+        <a:defRPr sz="4267" kern="1200">
           <a:solidFill>
             <a:schemeClr val="tx1"/>
           </a:solidFill>
@@ -3109,16 +2742,16 @@
           <a:cs typeface="+mn-cs"/>
         </a:defRPr>
       </a:lvl2pPr>
-      <a:lvl3pPr marL="1143000" indent="-228600" algn="l" defTabSz="914400" rtl="0" eaLnBrk="1" latinLnBrk="0" hangingPunct="1">
+      <a:lvl3pPr marL="2032025" indent="-406405" algn="l" defTabSz="1625620" rtl="0" eaLnBrk="1" latinLnBrk="0" hangingPunct="1">
         <a:lnSpc>
           <a:spcPct val="90000"/>
         </a:lnSpc>
         <a:spcBef>
-          <a:spcPts val="500"/>
+          <a:spcPts val="889"/>
         </a:spcBef>
         <a:buFont typeface="Arial" panose="020B0604020202020204" pitchFamily="34" charset="0"/>
         <a:buChar char="•"/>
-        <a:defRPr sz="2000" kern="1200">
+        <a:defRPr sz="3556" kern="1200">
           <a:solidFill>
             <a:schemeClr val="tx1"/>
           </a:solidFill>
@@ -3127,16 +2760,16 @@
           <a:cs typeface="+mn-cs"/>
         </a:defRPr>
       </a:lvl3pPr>
-      <a:lvl4pPr marL="1600200" indent="-228600" algn="l" defTabSz="914400" rtl="0" eaLnBrk="1" latinLnBrk="0" hangingPunct="1">
+      <a:lvl4pPr marL="2844836" indent="-406405" algn="l" defTabSz="1625620" rtl="0" eaLnBrk="1" latinLnBrk="0" hangingPunct="1">
         <a:lnSpc>
           <a:spcPct val="90000"/>
         </a:lnSpc>
         <a:spcBef>
-          <a:spcPts val="500"/>
+          <a:spcPts val="889"/>
         </a:spcBef>
         <a:buFont typeface="Arial" panose="020B0604020202020204" pitchFamily="34" charset="0"/>
         <a:buChar char="•"/>
-        <a:defRPr sz="1800" kern="1200">
+        <a:defRPr sz="3200" kern="1200">
           <a:solidFill>
             <a:schemeClr val="tx1"/>
           </a:solidFill>
@@ -3145,16 +2778,16 @@
           <a:cs typeface="+mn-cs"/>
         </a:defRPr>
       </a:lvl4pPr>
-      <a:lvl5pPr marL="2057400" indent="-228600" algn="l" defTabSz="914400" rtl="0" eaLnBrk="1" latinLnBrk="0" hangingPunct="1">
+      <a:lvl5pPr marL="3657646" indent="-406405" algn="l" defTabSz="1625620" rtl="0" eaLnBrk="1" latinLnBrk="0" hangingPunct="1">
         <a:lnSpc>
           <a:spcPct val="90000"/>
         </a:lnSpc>
         <a:spcBef>
-          <a:spcPts val="500"/>
+          <a:spcPts val="889"/>
         </a:spcBef>
         <a:buFont typeface="Arial" panose="020B0604020202020204" pitchFamily="34" charset="0"/>
         <a:buChar char="•"/>
-        <a:defRPr sz="1800" kern="1200">
+        <a:defRPr sz="3200" kern="1200">
           <a:solidFill>
             <a:schemeClr val="tx1"/>
           </a:solidFill>
@@ -3163,16 +2796,16 @@
           <a:cs typeface="+mn-cs"/>
         </a:defRPr>
       </a:lvl5pPr>
-      <a:lvl6pPr marL="2514600" indent="-228600" algn="l" defTabSz="914400" rtl="0" eaLnBrk="1" latinLnBrk="0" hangingPunct="1">
+      <a:lvl6pPr marL="4470456" indent="-406405" algn="l" defTabSz="1625620" rtl="0" eaLnBrk="1" latinLnBrk="0" hangingPunct="1">
         <a:lnSpc>
           <a:spcPct val="90000"/>
         </a:lnSpc>
         <a:spcBef>
-          <a:spcPts val="500"/>
+          <a:spcPts val="889"/>
         </a:spcBef>
         <a:buFont typeface="Arial" panose="020B0604020202020204" pitchFamily="34" charset="0"/>
         <a:buChar char="•"/>
-        <a:defRPr sz="1800" kern="1200">
+        <a:defRPr sz="3200" kern="1200">
           <a:solidFill>
             <a:schemeClr val="tx1"/>
           </a:solidFill>
@@ -3181,16 +2814,16 @@
           <a:cs typeface="+mn-cs"/>
         </a:defRPr>
       </a:lvl6pPr>
-      <a:lvl7pPr marL="2971800" indent="-228600" algn="l" defTabSz="914400" rtl="0" eaLnBrk="1" latinLnBrk="0" hangingPunct="1">
+      <a:lvl7pPr marL="5283266" indent="-406405" algn="l" defTabSz="1625620" rtl="0" eaLnBrk="1" latinLnBrk="0" hangingPunct="1">
         <a:lnSpc>
           <a:spcPct val="90000"/>
         </a:lnSpc>
         <a:spcBef>
-          <a:spcPts val="500"/>
+          <a:spcPts val="889"/>
         </a:spcBef>
         <a:buFont typeface="Arial" panose="020B0604020202020204" pitchFamily="34" charset="0"/>
         <a:buChar char="•"/>
-        <a:defRPr sz="1800" kern="1200">
+        <a:defRPr sz="3200" kern="1200">
           <a:solidFill>
             <a:schemeClr val="tx1"/>
           </a:solidFill>
@@ -3199,16 +2832,16 @@
           <a:cs typeface="+mn-cs"/>
         </a:defRPr>
       </a:lvl7pPr>
-      <a:lvl8pPr marL="3429000" indent="-228600" algn="l" defTabSz="914400" rtl="0" eaLnBrk="1" latinLnBrk="0" hangingPunct="1">
+      <a:lvl8pPr marL="6096076" indent="-406405" algn="l" defTabSz="1625620" rtl="0" eaLnBrk="1" latinLnBrk="0" hangingPunct="1">
         <a:lnSpc>
           <a:spcPct val="90000"/>
         </a:lnSpc>
         <a:spcBef>
-          <a:spcPts val="500"/>
+          <a:spcPts val="889"/>
         </a:spcBef>
         <a:buFont typeface="Arial" panose="020B0604020202020204" pitchFamily="34" charset="0"/>
         <a:buChar char="•"/>
-        <a:defRPr sz="1800" kern="1200">
+        <a:defRPr sz="3200" kern="1200">
           <a:solidFill>
             <a:schemeClr val="tx1"/>
           </a:solidFill>
@@ -3217,16 +2850,16 @@
           <a:cs typeface="+mn-cs"/>
         </a:defRPr>
       </a:lvl8pPr>
-      <a:lvl9pPr marL="3886200" indent="-228600" algn="l" defTabSz="914400" rtl="0" eaLnBrk="1" latinLnBrk="0" hangingPunct="1">
+      <a:lvl9pPr marL="6908886" indent="-406405" algn="l" defTabSz="1625620" rtl="0" eaLnBrk="1" latinLnBrk="0" hangingPunct="1">
         <a:lnSpc>
           <a:spcPct val="90000"/>
         </a:lnSpc>
         <a:spcBef>
-          <a:spcPts val="500"/>
+          <a:spcPts val="889"/>
         </a:spcBef>
         <a:buFont typeface="Arial" panose="020B0604020202020204" pitchFamily="34" charset="0"/>
         <a:buChar char="•"/>
-        <a:defRPr sz="1800" kern="1200">
+        <a:defRPr sz="3200" kern="1200">
           <a:solidFill>
             <a:schemeClr val="tx1"/>
           </a:solidFill>
@@ -3238,10 +2871,10 @@
     </p:bodyStyle>
     <p:otherStyle>
       <a:defPPr>
-        <a:defRPr lang="ru-RU"/>
+        <a:defRPr lang="en-US"/>
       </a:defPPr>
-      <a:lvl1pPr marL="0" algn="l" defTabSz="914400" rtl="0" eaLnBrk="1" latinLnBrk="0" hangingPunct="1">
-        <a:defRPr sz="1800" kern="1200">
+      <a:lvl1pPr marL="0" algn="l" defTabSz="1625620" rtl="0" eaLnBrk="1" latinLnBrk="0" hangingPunct="1">
+        <a:defRPr sz="3200" kern="1200">
           <a:solidFill>
             <a:schemeClr val="tx1"/>
           </a:solidFill>
@@ -3250,8 +2883,8 @@
           <a:cs typeface="+mn-cs"/>
         </a:defRPr>
       </a:lvl1pPr>
-      <a:lvl2pPr marL="457200" algn="l" defTabSz="914400" rtl="0" eaLnBrk="1" latinLnBrk="0" hangingPunct="1">
-        <a:defRPr sz="1800" kern="1200">
+      <a:lvl2pPr marL="812810" algn="l" defTabSz="1625620" rtl="0" eaLnBrk="1" latinLnBrk="0" hangingPunct="1">
+        <a:defRPr sz="3200" kern="1200">
           <a:solidFill>
             <a:schemeClr val="tx1"/>
           </a:solidFill>
@@ -3260,8 +2893,8 @@
           <a:cs typeface="+mn-cs"/>
         </a:defRPr>
       </a:lvl2pPr>
-      <a:lvl3pPr marL="914400" algn="l" defTabSz="914400" rtl="0" eaLnBrk="1" latinLnBrk="0" hangingPunct="1">
-        <a:defRPr sz="1800" kern="1200">
+      <a:lvl3pPr marL="1625620" algn="l" defTabSz="1625620" rtl="0" eaLnBrk="1" latinLnBrk="0" hangingPunct="1">
+        <a:defRPr sz="3200" kern="1200">
           <a:solidFill>
             <a:schemeClr val="tx1"/>
           </a:solidFill>
@@ -3270,8 +2903,8 @@
           <a:cs typeface="+mn-cs"/>
         </a:defRPr>
       </a:lvl3pPr>
-      <a:lvl4pPr marL="1371600" algn="l" defTabSz="914400" rtl="0" eaLnBrk="1" latinLnBrk="0" hangingPunct="1">
-        <a:defRPr sz="1800" kern="1200">
+      <a:lvl4pPr marL="2438430" algn="l" defTabSz="1625620" rtl="0" eaLnBrk="1" latinLnBrk="0" hangingPunct="1">
+        <a:defRPr sz="3200" kern="1200">
           <a:solidFill>
             <a:schemeClr val="tx1"/>
           </a:solidFill>
@@ -3280,8 +2913,8 @@
           <a:cs typeface="+mn-cs"/>
         </a:defRPr>
       </a:lvl4pPr>
-      <a:lvl5pPr marL="1828800" algn="l" defTabSz="914400" rtl="0" eaLnBrk="1" latinLnBrk="0" hangingPunct="1">
-        <a:defRPr sz="1800" kern="1200">
+      <a:lvl5pPr marL="3251241" algn="l" defTabSz="1625620" rtl="0" eaLnBrk="1" latinLnBrk="0" hangingPunct="1">
+        <a:defRPr sz="3200" kern="1200">
           <a:solidFill>
             <a:schemeClr val="tx1"/>
           </a:solidFill>
@@ -3290,8 +2923,8 @@
           <a:cs typeface="+mn-cs"/>
         </a:defRPr>
       </a:lvl5pPr>
-      <a:lvl6pPr marL="2286000" algn="l" defTabSz="914400" rtl="0" eaLnBrk="1" latinLnBrk="0" hangingPunct="1">
-        <a:defRPr sz="1800" kern="1200">
+      <a:lvl6pPr marL="4064051" algn="l" defTabSz="1625620" rtl="0" eaLnBrk="1" latinLnBrk="0" hangingPunct="1">
+        <a:defRPr sz="3200" kern="1200">
           <a:solidFill>
             <a:schemeClr val="tx1"/>
           </a:solidFill>
@@ -3300,8 +2933,8 @@
           <a:cs typeface="+mn-cs"/>
         </a:defRPr>
       </a:lvl6pPr>
-      <a:lvl7pPr marL="2743200" algn="l" defTabSz="914400" rtl="0" eaLnBrk="1" latinLnBrk="0" hangingPunct="1">
-        <a:defRPr sz="1800" kern="1200">
+      <a:lvl7pPr marL="4876861" algn="l" defTabSz="1625620" rtl="0" eaLnBrk="1" latinLnBrk="0" hangingPunct="1">
+        <a:defRPr sz="3200" kern="1200">
           <a:solidFill>
             <a:schemeClr val="tx1"/>
           </a:solidFill>
@@ -3310,8 +2943,8 @@
           <a:cs typeface="+mn-cs"/>
         </a:defRPr>
       </a:lvl7pPr>
-      <a:lvl8pPr marL="3200400" algn="l" defTabSz="914400" rtl="0" eaLnBrk="1" latinLnBrk="0" hangingPunct="1">
-        <a:defRPr sz="1800" kern="1200">
+      <a:lvl8pPr marL="5689671" algn="l" defTabSz="1625620" rtl="0" eaLnBrk="1" latinLnBrk="0" hangingPunct="1">
+        <a:defRPr sz="3200" kern="1200">
           <a:solidFill>
             <a:schemeClr val="tx1"/>
           </a:solidFill>
@@ -3320,8 +2953,8 @@
           <a:cs typeface="+mn-cs"/>
         </a:defRPr>
       </a:lvl8pPr>
-      <a:lvl9pPr marL="3657600" algn="l" defTabSz="914400" rtl="0" eaLnBrk="1" latinLnBrk="0" hangingPunct="1">
-        <a:defRPr sz="1800" kern="1200">
+      <a:lvl9pPr marL="6502481" algn="l" defTabSz="1625620" rtl="0" eaLnBrk="1" latinLnBrk="0" hangingPunct="1">
+        <a:defRPr sz="3200" kern="1200">
           <a:solidFill>
             <a:schemeClr val="tx1"/>
           </a:solidFill>
@@ -3445,6 +3078,128 @@
           <p:cNvPr id="2" name="Title 1">
             <a:extLst>
               <a:ext uri="{FF2B5EF4-FFF2-40B4-BE49-F238E27FC236}">
+                <a16:creationId xmlns:a16="http://schemas.microsoft.com/office/drawing/2014/main" id="{9FA9D8D4-9E4D-588E-C872-2671D87DBF25}"/>
+              </a:ext>
+            </a:extLst>
+          </p:cNvPr>
+          <p:cNvSpPr>
+            <a:spLocks noGrp="1"/>
+          </p:cNvSpPr>
+          <p:nvPr>
+            <p:ph type="title"/>
+          </p:nvPr>
+        </p:nvSpPr>
+        <p:spPr/>
+        <p:txBody>
+          <a:bodyPr/>
+          <a:lstStyle/>
+          <a:p>
+            <a:r>
+              <a:rPr lang="en-US" dirty="0"/>
+              <a:t>Sample1_device3</a:t>
+            </a:r>
+            <a:endParaRPr lang="ru-RU" dirty="0"/>
+          </a:p>
+        </p:txBody>
+      </p:sp>
+      <p:graphicFrame>
+        <p:nvGraphicFramePr>
+          <p:cNvPr id="3" name="Object 2">
+            <a:extLst>
+              <a:ext uri="{FF2B5EF4-FFF2-40B4-BE49-F238E27FC236}">
+                <a16:creationId xmlns:a16="http://schemas.microsoft.com/office/drawing/2014/main" id="{B3141EB9-6C8D-DF68-B3AF-46CB72560F58}"/>
+              </a:ext>
+            </a:extLst>
+          </p:cNvPr>
+          <p:cNvGraphicFramePr>
+            <a:graphicFrameLocks noChangeAspect="1"/>
+          </p:cNvGraphicFramePr>
+          <p:nvPr>
+            <p:extLst>
+              <p:ext uri="{D42A27DB-BD31-4B8C-83A1-F6EECF244321}">
+                <p14:modId xmlns:p14="http://schemas.microsoft.com/office/powerpoint/2010/main" val="1809738738"/>
+              </p:ext>
+            </p:extLst>
+          </p:nvPr>
+        </p:nvGraphicFramePr>
+        <p:xfrm>
+          <a:off x="4879294" y="5118200"/>
+          <a:ext cx="3705000" cy="2835000"/>
+        </p:xfrm>
+        <a:graphic>
+          <a:graphicData uri="http://schemas.openxmlformats.org/presentationml/2006/ole">
+            <mc:AlternateContent xmlns:mc="http://schemas.openxmlformats.org/markup-compatibility/2006">
+              <mc:Choice xmlns:v="urn:schemas-microsoft-com:vml" Requires="v">
+                <p:oleObj name="Graph" r:id="rId2" imgW="3920760" imgH="3000960" progId="Origin95.Graph">
+                  <p:embed/>
+                </p:oleObj>
+              </mc:Choice>
+              <mc:Fallback>
+                <p:oleObj name="Graph" r:id="rId2" imgW="3920760" imgH="3000960" progId="Origin95.Graph">
+                  <p:embed/>
+                  <p:pic>
+                    <p:nvPicPr>
+                      <p:cNvPr id="0" name=""/>
+                      <p:cNvPicPr/>
+                      <p:nvPr/>
+                    </p:nvPicPr>
+                    <p:blipFill>
+                      <a:blip r:embed="rId3"/>
+                      <a:stretch>
+                        <a:fillRect/>
+                      </a:stretch>
+                    </p:blipFill>
+                    <p:spPr>
+                      <a:xfrm>
+                        <a:off x="4879294" y="5118200"/>
+                        <a:ext cx="3705000" cy="2835000"/>
+                      </a:xfrm>
+                      <a:prstGeom prst="rect">
+                        <a:avLst/>
+                      </a:prstGeom>
+                    </p:spPr>
+                  </p:pic>
+                </p:oleObj>
+              </mc:Fallback>
+            </mc:AlternateContent>
+          </a:graphicData>
+        </a:graphic>
+      </p:graphicFrame>
+    </p:spTree>
+    <p:extLst>
+      <p:ext uri="{BB962C8B-B14F-4D97-AF65-F5344CB8AC3E}">
+        <p14:creationId xmlns:p14="http://schemas.microsoft.com/office/powerpoint/2010/main" val="2392298662"/>
+      </p:ext>
+    </p:extLst>
+  </p:cSld>
+  <p:clrMapOvr>
+    <a:masterClrMapping/>
+  </p:clrMapOvr>
+</p:sld>
+</file>
+
+<file path=ppt/slides/slide11.xml><?xml version="1.0" encoding="utf-8"?>
+<p:sld xmlns:a="http://schemas.openxmlformats.org/drawingml/2006/main" xmlns:r="http://schemas.openxmlformats.org/officeDocument/2006/relationships" xmlns:p="http://schemas.openxmlformats.org/presentationml/2006/main">
+  <p:cSld>
+    <p:spTree>
+      <p:nvGrpSpPr>
+        <p:cNvPr id="1" name=""/>
+        <p:cNvGrpSpPr/>
+        <p:nvPr/>
+      </p:nvGrpSpPr>
+      <p:grpSpPr>
+        <a:xfrm>
+          <a:off x="0" y="0"/>
+          <a:ext cx="0" cy="0"/>
+          <a:chOff x="0" y="0"/>
+          <a:chExt cx="0" cy="0"/>
+        </a:xfrm>
+      </p:grpSpPr>
+      <p:sp>
+        <p:nvSpPr>
+          <p:cNvPr id="2" name="Title 1">
+            <a:extLst>
+              <a:ext uri="{FF2B5EF4-FFF2-40B4-BE49-F238E27FC236}">
                 <a16:creationId xmlns:a16="http://schemas.microsoft.com/office/drawing/2014/main" id="{CCAFF360-A75B-FFB2-E3B6-63D79FD59EE4}"/>
               </a:ext>
             </a:extLst>
@@ -3490,7 +3245,321 @@
           </p:nvPr>
         </p:nvGraphicFramePr>
         <p:xfrm>
-          <a:off x="0" y="1690688"/>
+          <a:off x="4699001" y="5118200"/>
+          <a:ext cx="3705000" cy="2835000"/>
+        </p:xfrm>
+        <a:graphic>
+          <a:graphicData uri="http://schemas.openxmlformats.org/presentationml/2006/ole">
+            <mc:AlternateContent xmlns:mc="http://schemas.openxmlformats.org/markup-compatibility/2006">
+              <mc:Choice xmlns:v="urn:schemas-microsoft-com:vml" Requires="v">
+                <p:oleObj name="Graph" r:id="rId2" imgW="3920760" imgH="3000960" progId="Origin95.Graph">
+                  <p:embed/>
+                </p:oleObj>
+              </mc:Choice>
+              <mc:Fallback>
+                <p:oleObj name="Graph" r:id="rId2" imgW="3920760" imgH="3000960" progId="Origin95.Graph">
+                  <p:embed/>
+                  <p:pic>
+                    <p:nvPicPr>
+                      <p:cNvPr id="0" name=""/>
+                      <p:cNvPicPr/>
+                      <p:nvPr/>
+                    </p:nvPicPr>
+                    <p:blipFill>
+                      <a:blip r:embed="rId3"/>
+                      <a:stretch>
+                        <a:fillRect/>
+                      </a:stretch>
+                    </p:blipFill>
+                    <p:spPr>
+                      <a:xfrm>
+                        <a:off x="4699001" y="5118200"/>
+                        <a:ext cx="3705000" cy="2835000"/>
+                      </a:xfrm>
+                      <a:prstGeom prst="rect">
+                        <a:avLst/>
+                      </a:prstGeom>
+                    </p:spPr>
+                  </p:pic>
+                </p:oleObj>
+              </mc:Fallback>
+            </mc:AlternateContent>
+          </a:graphicData>
+        </a:graphic>
+      </p:graphicFrame>
+      <p:graphicFrame>
+        <p:nvGraphicFramePr>
+          <p:cNvPr id="4" name="Object 3">
+            <a:extLst>
+              <a:ext uri="{FF2B5EF4-FFF2-40B4-BE49-F238E27FC236}">
+                <a16:creationId xmlns:a16="http://schemas.microsoft.com/office/drawing/2014/main" id="{BF983598-B0B5-11AC-0EB1-8ADA35D11C7F}"/>
+              </a:ext>
+            </a:extLst>
+          </p:cNvPr>
+          <p:cNvGraphicFramePr>
+            <a:graphicFrameLocks noChangeAspect="1"/>
+          </p:cNvGraphicFramePr>
+          <p:nvPr>
+            <p:extLst>
+              <p:ext uri="{D42A27DB-BD31-4B8C-83A1-F6EECF244321}">
+                <p14:modId xmlns:p14="http://schemas.microsoft.com/office/powerpoint/2010/main" val="1221462422"/>
+              </p:ext>
+            </p:extLst>
+          </p:nvPr>
+        </p:nvGraphicFramePr>
+        <p:xfrm>
+          <a:off x="7892258" y="5118200"/>
+          <a:ext cx="3705000" cy="2835000"/>
+        </p:xfrm>
+        <a:graphic>
+          <a:graphicData uri="http://schemas.openxmlformats.org/presentationml/2006/ole">
+            <mc:AlternateContent xmlns:mc="http://schemas.openxmlformats.org/markup-compatibility/2006">
+              <mc:Choice xmlns:v="urn:schemas-microsoft-com:vml" Requires="v">
+                <p:oleObj name="Graph" r:id="rId4" imgW="3920760" imgH="3000960" progId="Origin95.Graph">
+                  <p:embed/>
+                </p:oleObj>
+              </mc:Choice>
+              <mc:Fallback>
+                <p:oleObj name="Graph" r:id="rId4" imgW="3920760" imgH="3000960" progId="Origin95.Graph">
+                  <p:embed/>
+                  <p:pic>
+                    <p:nvPicPr>
+                      <p:cNvPr id="0" name=""/>
+                      <p:cNvPicPr/>
+                      <p:nvPr/>
+                    </p:nvPicPr>
+                    <p:blipFill>
+                      <a:blip r:embed="rId5"/>
+                      <a:stretch>
+                        <a:fillRect/>
+                      </a:stretch>
+                    </p:blipFill>
+                    <p:spPr>
+                      <a:xfrm>
+                        <a:off x="7892258" y="5118200"/>
+                        <a:ext cx="3705000" cy="2835000"/>
+                      </a:xfrm>
+                      <a:prstGeom prst="rect">
+                        <a:avLst/>
+                      </a:prstGeom>
+                    </p:spPr>
+                  </p:pic>
+                </p:oleObj>
+              </mc:Fallback>
+            </mc:AlternateContent>
+          </a:graphicData>
+        </a:graphic>
+      </p:graphicFrame>
+    </p:spTree>
+    <p:extLst>
+      <p:ext uri="{BB962C8B-B14F-4D97-AF65-F5344CB8AC3E}">
+        <p14:creationId xmlns:p14="http://schemas.microsoft.com/office/powerpoint/2010/main" val="2472297408"/>
+      </p:ext>
+    </p:extLst>
+  </p:cSld>
+  <p:clrMapOvr>
+    <a:masterClrMapping/>
+  </p:clrMapOvr>
+</p:sld>
+</file>
+
+<file path=ppt/slides/slide12.xml><?xml version="1.0" encoding="utf-8"?>
+<p:sld xmlns:a="http://schemas.openxmlformats.org/drawingml/2006/main" xmlns:r="http://schemas.openxmlformats.org/officeDocument/2006/relationships" xmlns:p="http://schemas.openxmlformats.org/presentationml/2006/main">
+  <p:cSld>
+    <p:spTree>
+      <p:nvGrpSpPr>
+        <p:cNvPr id="1" name=""/>
+        <p:cNvGrpSpPr/>
+        <p:nvPr/>
+      </p:nvGrpSpPr>
+      <p:grpSpPr>
+        <a:xfrm>
+          <a:off x="0" y="0"/>
+          <a:ext cx="0" cy="0"/>
+          <a:chOff x="0" y="0"/>
+          <a:chExt cx="0" cy="0"/>
+        </a:xfrm>
+      </p:grpSpPr>
+      <p:sp>
+        <p:nvSpPr>
+          <p:cNvPr id="2" name="Title 1">
+            <a:extLst>
+              <a:ext uri="{FF2B5EF4-FFF2-40B4-BE49-F238E27FC236}">
+                <a16:creationId xmlns:a16="http://schemas.microsoft.com/office/drawing/2014/main" id="{13BBEC0E-5521-48CA-51ED-89C0696E3FC4}"/>
+              </a:ext>
+            </a:extLst>
+          </p:cNvPr>
+          <p:cNvSpPr>
+            <a:spLocks noGrp="1"/>
+          </p:cNvSpPr>
+          <p:nvPr>
+            <p:ph type="title"/>
+          </p:nvPr>
+        </p:nvSpPr>
+        <p:spPr/>
+        <p:txBody>
+          <a:bodyPr/>
+          <a:lstStyle/>
+          <a:p>
+            <a:r>
+              <a:rPr lang="en-US"/>
+              <a:t>Sample1_device3</a:t>
+            </a:r>
+            <a:endParaRPr lang="ru-RU"/>
+          </a:p>
+        </p:txBody>
+      </p:sp>
+      <p:graphicFrame>
+        <p:nvGraphicFramePr>
+          <p:cNvPr id="3" name="Object 2">
+            <a:extLst>
+              <a:ext uri="{FF2B5EF4-FFF2-40B4-BE49-F238E27FC236}">
+                <a16:creationId xmlns:a16="http://schemas.microsoft.com/office/drawing/2014/main" id="{F7DDD338-9A96-21E1-62D8-6625A1F102AD}"/>
+              </a:ext>
+            </a:extLst>
+          </p:cNvPr>
+          <p:cNvGraphicFramePr>
+            <a:graphicFrameLocks noChangeAspect="1"/>
+          </p:cNvGraphicFramePr>
+          <p:nvPr>
+            <p:extLst>
+              <p:ext uri="{D42A27DB-BD31-4B8C-83A1-F6EECF244321}">
+                <p14:modId xmlns:p14="http://schemas.microsoft.com/office/powerpoint/2010/main" val="975661512"/>
+              </p:ext>
+            </p:extLst>
+          </p:nvPr>
+        </p:nvGraphicFramePr>
+        <p:xfrm>
+          <a:off x="4602762" y="5118200"/>
+          <a:ext cx="3705000" cy="2835000"/>
+        </p:xfrm>
+        <a:graphic>
+          <a:graphicData uri="http://schemas.openxmlformats.org/presentationml/2006/ole">
+            <mc:AlternateContent xmlns:mc="http://schemas.openxmlformats.org/markup-compatibility/2006">
+              <mc:Choice xmlns:v="urn:schemas-microsoft-com:vml" Requires="v">
+                <p:oleObj name="Graph" r:id="rId2" imgW="3920760" imgH="3000960" progId="Origin95.Graph">
+                  <p:embed/>
+                </p:oleObj>
+              </mc:Choice>
+              <mc:Fallback>
+                <p:oleObj name="Graph" r:id="rId2" imgW="3920760" imgH="3000960" progId="Origin95.Graph">
+                  <p:embed/>
+                  <p:pic>
+                    <p:nvPicPr>
+                      <p:cNvPr id="0" name=""/>
+                      <p:cNvPicPr/>
+                      <p:nvPr/>
+                    </p:nvPicPr>
+                    <p:blipFill>
+                      <a:blip r:embed="rId3"/>
+                      <a:stretch>
+                        <a:fillRect/>
+                      </a:stretch>
+                    </p:blipFill>
+                    <p:spPr>
+                      <a:xfrm>
+                        <a:off x="4602762" y="5118200"/>
+                        <a:ext cx="3705000" cy="2835000"/>
+                      </a:xfrm>
+                      <a:prstGeom prst="rect">
+                        <a:avLst/>
+                      </a:prstGeom>
+                    </p:spPr>
+                  </p:pic>
+                </p:oleObj>
+              </mc:Fallback>
+            </mc:AlternateContent>
+          </a:graphicData>
+        </a:graphic>
+      </p:graphicFrame>
+    </p:spTree>
+    <p:extLst>
+      <p:ext uri="{BB962C8B-B14F-4D97-AF65-F5344CB8AC3E}">
+        <p14:creationId xmlns:p14="http://schemas.microsoft.com/office/powerpoint/2010/main" val="3214348473"/>
+      </p:ext>
+    </p:extLst>
+  </p:cSld>
+  <p:clrMapOvr>
+    <a:masterClrMapping/>
+  </p:clrMapOvr>
+</p:sld>
+</file>
+
+<file path=ppt/slides/slide13.xml><?xml version="1.0" encoding="utf-8"?>
+<p:sld xmlns:a="http://schemas.openxmlformats.org/drawingml/2006/main" xmlns:r="http://schemas.openxmlformats.org/officeDocument/2006/relationships" xmlns:p="http://schemas.openxmlformats.org/presentationml/2006/main">
+  <p:cSld>
+    <p:spTree>
+      <p:nvGrpSpPr>
+        <p:cNvPr id="1" name=""/>
+        <p:cNvGrpSpPr/>
+        <p:nvPr/>
+      </p:nvGrpSpPr>
+      <p:grpSpPr>
+        <a:xfrm>
+          <a:off x="0" y="0"/>
+          <a:ext cx="0" cy="0"/>
+          <a:chOff x="0" y="0"/>
+          <a:chExt cx="0" cy="0"/>
+        </a:xfrm>
+      </p:grpSpPr>
+      <p:sp>
+        <p:nvSpPr>
+          <p:cNvPr id="2" name="Title 1">
+            <a:extLst>
+              <a:ext uri="{FF2B5EF4-FFF2-40B4-BE49-F238E27FC236}">
+                <a16:creationId xmlns:a16="http://schemas.microsoft.com/office/drawing/2014/main" id="{938ED330-8B6E-FA06-E8FE-E66C5F4BE677}"/>
+              </a:ext>
+            </a:extLst>
+          </p:cNvPr>
+          <p:cNvSpPr>
+            <a:spLocks noGrp="1"/>
+          </p:cNvSpPr>
+          <p:nvPr>
+            <p:ph type="title"/>
+          </p:nvPr>
+        </p:nvSpPr>
+        <p:spPr>
+          <a:xfrm>
+            <a:off x="5449295" y="427771"/>
+            <a:ext cx="3311751" cy="930640"/>
+          </a:xfrm>
+        </p:spPr>
+        <p:txBody>
+          <a:bodyPr>
+            <a:normAutofit/>
+          </a:bodyPr>
+          <a:lstStyle/>
+          <a:p>
+            <a:r>
+              <a:rPr lang="en-US" dirty="0"/>
+              <a:t>Sample1_device3</a:t>
+            </a:r>
+            <a:endParaRPr lang="ru-RU" dirty="0"/>
+          </a:p>
+        </p:txBody>
+      </p:sp>
+      <p:graphicFrame>
+        <p:nvGraphicFramePr>
+          <p:cNvPr id="3" name="Object 2">
+            <a:extLst>
+              <a:ext uri="{FF2B5EF4-FFF2-40B4-BE49-F238E27FC236}">
+                <a16:creationId xmlns:a16="http://schemas.microsoft.com/office/drawing/2014/main" id="{26334D92-176C-83FD-4E5B-280D29FCA6F2}"/>
+              </a:ext>
+            </a:extLst>
+          </p:cNvPr>
+          <p:cNvGraphicFramePr>
+            <a:graphicFrameLocks noChangeAspect="1"/>
+          </p:cNvGraphicFramePr>
+          <p:nvPr>
+            <p:extLst>
+              <p:ext uri="{D42A27DB-BD31-4B8C-83A1-F6EECF244321}">
+                <p14:modId xmlns:p14="http://schemas.microsoft.com/office/powerpoint/2010/main" val="2096866201"/>
+              </p:ext>
+            </p:extLst>
+          </p:nvPr>
+        </p:nvGraphicFramePr>
+        <p:xfrm>
+          <a:off x="4842767" y="6917713"/>
           <a:ext cx="6586667" cy="5040000"/>
         </p:xfrm>
         <a:graphic>
@@ -3518,7 +3587,7 @@
                     </p:blipFill>
                     <p:spPr>
                       <a:xfrm>
-                        <a:off x="0" y="1690688"/>
+                        <a:off x="4842767" y="6917713"/>
                         <a:ext cx="6586667" cy="5040000"/>
                       </a:xfrm>
                       <a:prstGeom prst="rect">
@@ -3537,7 +3606,7 @@
           <p:cNvPr id="4" name="Object 3">
             <a:extLst>
               <a:ext uri="{FF2B5EF4-FFF2-40B4-BE49-F238E27FC236}">
-                <a16:creationId xmlns:a16="http://schemas.microsoft.com/office/drawing/2014/main" id="{BF983598-B0B5-11AC-0EB1-8ADA35D11C7F}"/>
+                <a16:creationId xmlns:a16="http://schemas.microsoft.com/office/drawing/2014/main" id="{C665EE71-DE6A-0F3E-1540-7210A134F2EC}"/>
               </a:ext>
             </a:extLst>
           </p:cNvPr>
@@ -3547,14 +3616,14 @@
           <p:nvPr>
             <p:extLst>
               <p:ext uri="{D42A27DB-BD31-4B8C-83A1-F6EECF244321}">
-                <p14:modId xmlns:p14="http://schemas.microsoft.com/office/powerpoint/2010/main" val="1221462422"/>
+                <p14:modId xmlns:p14="http://schemas.microsoft.com/office/powerpoint/2010/main" val="2595652106"/>
               </p:ext>
             </p:extLst>
           </p:nvPr>
         </p:nvGraphicFramePr>
         <p:xfrm>
-          <a:off x="5676900" y="1690688"/>
-          <a:ext cx="6586667" cy="5040000"/>
+          <a:off x="4842766" y="2198354"/>
+          <a:ext cx="6586668" cy="5040000"/>
         </p:xfrm>
         <a:graphic>
           <a:graphicData uri="http://schemas.openxmlformats.org/presentationml/2006/ole">
@@ -3581,7 +3650,134 @@
                     </p:blipFill>
                     <p:spPr>
                       <a:xfrm>
-                        <a:off x="5676900" y="1690688"/>
+                        <a:off x="4842766" y="2198354"/>
+                        <a:ext cx="6586668" cy="5040000"/>
+                      </a:xfrm>
+                      <a:prstGeom prst="rect">
+                        <a:avLst/>
+                      </a:prstGeom>
+                    </p:spPr>
+                  </p:pic>
+                </p:oleObj>
+              </mc:Fallback>
+            </mc:AlternateContent>
+          </a:graphicData>
+        </a:graphic>
+      </p:graphicFrame>
+    </p:spTree>
+    <p:extLst>
+      <p:ext uri="{BB962C8B-B14F-4D97-AF65-F5344CB8AC3E}">
+        <p14:creationId xmlns:p14="http://schemas.microsoft.com/office/powerpoint/2010/main" val="2477821963"/>
+      </p:ext>
+    </p:extLst>
+  </p:cSld>
+  <p:clrMapOvr>
+    <a:masterClrMapping/>
+  </p:clrMapOvr>
+</p:sld>
+</file>
+
+<file path=ppt/slides/slide14.xml><?xml version="1.0" encoding="utf-8"?>
+<p:sld xmlns:a="http://schemas.openxmlformats.org/drawingml/2006/main" xmlns:r="http://schemas.openxmlformats.org/officeDocument/2006/relationships" xmlns:p="http://schemas.openxmlformats.org/presentationml/2006/main">
+  <p:cSld>
+    <p:spTree>
+      <p:nvGrpSpPr>
+        <p:cNvPr id="1" name=""/>
+        <p:cNvGrpSpPr/>
+        <p:nvPr/>
+      </p:nvGrpSpPr>
+      <p:grpSpPr>
+        <a:xfrm>
+          <a:off x="0" y="0"/>
+          <a:ext cx="0" cy="0"/>
+          <a:chOff x="0" y="0"/>
+          <a:chExt cx="0" cy="0"/>
+        </a:xfrm>
+      </p:grpSpPr>
+      <p:sp>
+        <p:nvSpPr>
+          <p:cNvPr id="2" name="Title 1">
+            <a:extLst>
+              <a:ext uri="{FF2B5EF4-FFF2-40B4-BE49-F238E27FC236}">
+                <a16:creationId xmlns:a16="http://schemas.microsoft.com/office/drawing/2014/main" id="{E2ED33DA-9165-923B-0597-78BFA3004EB3}"/>
+              </a:ext>
+            </a:extLst>
+          </p:cNvPr>
+          <p:cNvSpPr>
+            <a:spLocks noGrp="1"/>
+          </p:cNvSpPr>
+          <p:nvPr>
+            <p:ph type="title"/>
+          </p:nvPr>
+        </p:nvSpPr>
+        <p:spPr>
+          <a:xfrm>
+            <a:off x="5012228" y="0"/>
+            <a:ext cx="3291620" cy="1707224"/>
+          </a:xfrm>
+        </p:spPr>
+        <p:txBody>
+          <a:bodyPr/>
+          <a:lstStyle/>
+          <a:p>
+            <a:r>
+              <a:rPr lang="en-US" dirty="0"/>
+              <a:t>Sample1_device3</a:t>
+            </a:r>
+            <a:endParaRPr lang="ru-RU" dirty="0"/>
+          </a:p>
+        </p:txBody>
+      </p:sp>
+      <p:graphicFrame>
+        <p:nvGraphicFramePr>
+          <p:cNvPr id="3" name="Object 2">
+            <a:extLst>
+              <a:ext uri="{FF2B5EF4-FFF2-40B4-BE49-F238E27FC236}">
+                <a16:creationId xmlns:a16="http://schemas.microsoft.com/office/drawing/2014/main" id="{36A9631E-E64E-E519-1963-89F68B9EB64E}"/>
+              </a:ext>
+            </a:extLst>
+          </p:cNvPr>
+          <p:cNvGraphicFramePr>
+            <a:graphicFrameLocks noChangeAspect="1"/>
+          </p:cNvGraphicFramePr>
+          <p:nvPr>
+            <p:extLst>
+              <p:ext uri="{D42A27DB-BD31-4B8C-83A1-F6EECF244321}">
+                <p14:modId xmlns:p14="http://schemas.microsoft.com/office/powerpoint/2010/main" val="2793164310"/>
+              </p:ext>
+            </p:extLst>
+          </p:nvPr>
+        </p:nvGraphicFramePr>
+        <p:xfrm>
+          <a:off x="6167439" y="4595812"/>
+          <a:ext cx="6586667" cy="5040000"/>
+        </p:xfrm>
+        <a:graphic>
+          <a:graphicData uri="http://schemas.openxmlformats.org/presentationml/2006/ole">
+            <mc:AlternateContent xmlns:mc="http://schemas.openxmlformats.org/markup-compatibility/2006">
+              <mc:Choice xmlns:v="urn:schemas-microsoft-com:vml" Requires="v">
+                <p:oleObj name="Graph" r:id="rId2" imgW="3920760" imgH="3000960" progId="Origin95.Graph">
+                  <p:embed/>
+                </p:oleObj>
+              </mc:Choice>
+              <mc:Fallback>
+                <p:oleObj name="Graph" r:id="rId2" imgW="3920760" imgH="3000960" progId="Origin95.Graph">
+                  <p:embed/>
+                  <p:pic>
+                    <p:nvPicPr>
+                      <p:cNvPr id="0" name=""/>
+                      <p:cNvPicPr/>
+                      <p:nvPr/>
+                    </p:nvPicPr>
+                    <p:blipFill>
+                      <a:blip r:embed="rId3"/>
+                      <a:stretch>
+                        <a:fillRect/>
+                      </a:stretch>
+                    </p:blipFill>
+                    <p:spPr>
+                      <a:xfrm>
+                        <a:off x="6167439" y="4595812"/>
                         <a:ext cx="6586667" cy="5040000"/>
                       </a:xfrm>
                       <a:prstGeom prst="rect">
@@ -3598,7 +3794,7 @@
     </p:spTree>
     <p:extLst>
       <p:ext uri="{BB962C8B-B14F-4D97-AF65-F5344CB8AC3E}">
-        <p14:creationId xmlns:p14="http://schemas.microsoft.com/office/powerpoint/2010/main" val="2472297408"/>
+        <p14:creationId xmlns:p14="http://schemas.microsoft.com/office/powerpoint/2010/main" val="2594188361"/>
       </p:ext>
     </p:extLst>
   </p:cSld>
@@ -3608,7 +3804,7 @@
 </p:sld>
 </file>
 
-<file path=ppt/slides/slide11.xml><?xml version="1.0" encoding="utf-8"?>
+<file path=ppt/slides/slide15.xml><?xml version="1.0" encoding="utf-8"?>
 <p:sld xmlns:a="http://schemas.openxmlformats.org/drawingml/2006/main" xmlns:r="http://schemas.openxmlformats.org/officeDocument/2006/relationships" xmlns:p="http://schemas.openxmlformats.org/presentationml/2006/main">
   <p:cSld>
     <p:spTree>
@@ -3630,7 +3826,7 @@
           <p:cNvPr id="2" name="Title 1">
             <a:extLst>
               <a:ext uri="{FF2B5EF4-FFF2-40B4-BE49-F238E27FC236}">
-                <a16:creationId xmlns:a16="http://schemas.microsoft.com/office/drawing/2014/main" id="{13BBEC0E-5521-48CA-51ED-89C0696E3FC4}"/>
+                <a16:creationId xmlns:a16="http://schemas.microsoft.com/office/drawing/2014/main" id="{07A87DEF-965C-9DFE-CEAC-7A5ADEBA96C0}"/>
               </a:ext>
             </a:extLst>
           </p:cNvPr>
@@ -3646,18 +3842,77 @@
           <a:bodyPr/>
           <a:lstStyle/>
           <a:p>
-            <a:r>
-              <a:rPr lang="en-US"/>
-              <a:t>Sample1_device3</a:t>
-            </a:r>
             <a:endParaRPr lang="ru-RU"/>
           </a:p>
         </p:txBody>
       </p:sp>
+      <p:graphicFrame>
+        <p:nvGraphicFramePr>
+          <p:cNvPr id="3" name="Object 2">
+            <a:extLst>
+              <a:ext uri="{FF2B5EF4-FFF2-40B4-BE49-F238E27FC236}">
+                <a16:creationId xmlns:a16="http://schemas.microsoft.com/office/drawing/2014/main" id="{B685C466-A8AE-EE9A-53CE-2C6AABD90B73}"/>
+              </a:ext>
+            </a:extLst>
+          </p:cNvPr>
+          <p:cNvGraphicFramePr>
+            <a:graphicFrameLocks noChangeAspect="1"/>
+          </p:cNvGraphicFramePr>
+          <p:nvPr>
+            <p:extLst>
+              <p:ext uri="{D42A27DB-BD31-4B8C-83A1-F6EECF244321}">
+                <p14:modId xmlns:p14="http://schemas.microsoft.com/office/powerpoint/2010/main" val="3529413231"/>
+              </p:ext>
+            </p:extLst>
+          </p:nvPr>
+        </p:nvGraphicFramePr>
+        <p:xfrm>
+          <a:off x="-1125416" y="1827392"/>
+          <a:ext cx="15861323" cy="12136801"/>
+        </p:xfrm>
+        <a:graphic>
+          <a:graphicData uri="http://schemas.openxmlformats.org/presentationml/2006/ole">
+            <mc:AlternateContent xmlns:mc="http://schemas.openxmlformats.org/markup-compatibility/2006">
+              <mc:Choice xmlns:v="urn:schemas-microsoft-com:vml" Requires="v">
+                <p:oleObj name="Graph" r:id="rId2" imgW="3920760" imgH="3000960" progId="Origin95.Graph">
+                  <p:embed/>
+                </p:oleObj>
+              </mc:Choice>
+              <mc:Fallback>
+                <p:oleObj name="Graph" r:id="rId2" imgW="3920760" imgH="3000960" progId="Origin95.Graph">
+                  <p:embed/>
+                  <p:pic>
+                    <p:nvPicPr>
+                      <p:cNvPr id="0" name=""/>
+                      <p:cNvPicPr/>
+                      <p:nvPr/>
+                    </p:nvPicPr>
+                    <p:blipFill>
+                      <a:blip r:embed="rId3"/>
+                      <a:stretch>
+                        <a:fillRect/>
+                      </a:stretch>
+                    </p:blipFill>
+                    <p:spPr>
+                      <a:xfrm>
+                        <a:off x="-1125416" y="1827392"/>
+                        <a:ext cx="15861323" cy="12136801"/>
+                      </a:xfrm>
+                      <a:prstGeom prst="rect">
+                        <a:avLst/>
+                      </a:prstGeom>
+                    </p:spPr>
+                  </p:pic>
+                </p:oleObj>
+              </mc:Fallback>
+            </mc:AlternateContent>
+          </a:graphicData>
+        </a:graphic>
+      </p:graphicFrame>
     </p:spTree>
     <p:extLst>
       <p:ext uri="{BB962C8B-B14F-4D97-AF65-F5344CB8AC3E}">
-        <p14:creationId xmlns:p14="http://schemas.microsoft.com/office/powerpoint/2010/main" val="3214348473"/>
+        <p14:creationId xmlns:p14="http://schemas.microsoft.com/office/powerpoint/2010/main" val="4112446208"/>
       </p:ext>
     </p:extLst>
   </p:cSld>
@@ -3668,6 +3923,61 @@
 </file>
 
 <file path=ppt/slides/slide2.xml><?xml version="1.0" encoding="utf-8"?>
+<p:sld xmlns:a="http://schemas.openxmlformats.org/drawingml/2006/main" xmlns:r="http://schemas.openxmlformats.org/officeDocument/2006/relationships" xmlns:p="http://schemas.openxmlformats.org/presentationml/2006/main">
+  <p:cSld>
+    <p:spTree>
+      <p:nvGrpSpPr>
+        <p:cNvPr id="1" name=""/>
+        <p:cNvGrpSpPr/>
+        <p:nvPr/>
+      </p:nvGrpSpPr>
+      <p:grpSpPr>
+        <a:xfrm>
+          <a:off x="0" y="0"/>
+          <a:ext cx="0" cy="0"/>
+          <a:chOff x="0" y="0"/>
+          <a:chExt cx="0" cy="0"/>
+        </a:xfrm>
+      </p:grpSpPr>
+      <p:sp>
+        <p:nvSpPr>
+          <p:cNvPr id="2" name="Title 1">
+            <a:extLst>
+              <a:ext uri="{FF2B5EF4-FFF2-40B4-BE49-F238E27FC236}">
+                <a16:creationId xmlns:a16="http://schemas.microsoft.com/office/drawing/2014/main" id="{15509B9F-3A78-4119-B0BC-629D296B3275}"/>
+              </a:ext>
+            </a:extLst>
+          </p:cNvPr>
+          <p:cNvSpPr>
+            <a:spLocks noGrp="1"/>
+          </p:cNvSpPr>
+          <p:nvPr>
+            <p:ph type="title"/>
+          </p:nvPr>
+        </p:nvSpPr>
+        <p:spPr/>
+        <p:txBody>
+          <a:bodyPr/>
+          <a:lstStyle/>
+          <a:p>
+            <a:endParaRPr lang="ru-RU"/>
+          </a:p>
+        </p:txBody>
+      </p:sp>
+    </p:spTree>
+    <p:extLst>
+      <p:ext uri="{BB962C8B-B14F-4D97-AF65-F5344CB8AC3E}">
+        <p14:creationId xmlns:p14="http://schemas.microsoft.com/office/powerpoint/2010/main" val="3983299303"/>
+      </p:ext>
+    </p:extLst>
+  </p:cSld>
+  <p:clrMapOvr>
+    <a:masterClrMapping/>
+  </p:clrMapOvr>
+</p:sld>
+</file>
+
+<file path=ppt/slides/slide3.xml><?xml version="1.0" encoding="utf-8"?>
 <p:sld xmlns:a="http://schemas.openxmlformats.org/drawingml/2006/main" xmlns:r="http://schemas.openxmlformats.org/officeDocument/2006/relationships" xmlns:p="http://schemas.openxmlformats.org/presentationml/2006/main">
   <p:cSld>
     <p:spTree>
@@ -3697,7 +4007,7 @@
 </p:sld>
 </file>
 
-<file path=ppt/slides/slide3.xml><?xml version="1.0" encoding="utf-8"?>
+<file path=ppt/slides/slide4.xml><?xml version="1.0" encoding="utf-8"?>
 <p:sld xmlns:a="http://schemas.openxmlformats.org/drawingml/2006/main" xmlns:r="http://schemas.openxmlformats.org/officeDocument/2006/relationships" xmlns:p="http://schemas.openxmlformats.org/presentationml/2006/main">
   <p:cSld>
     <p:spTree>
@@ -3727,103 +4037,6 @@
 </p:sld>
 </file>
 
-<file path=ppt/slides/slide4.xml><?xml version="1.0" encoding="utf-8"?>
-<p:sld xmlns:a="http://schemas.openxmlformats.org/drawingml/2006/main" xmlns:r="http://schemas.openxmlformats.org/officeDocument/2006/relationships" xmlns:p="http://schemas.openxmlformats.org/presentationml/2006/main">
-  <p:cSld>
-    <p:spTree>
-      <p:nvGrpSpPr>
-        <p:cNvPr id="1" name=""/>
-        <p:cNvGrpSpPr/>
-        <p:nvPr/>
-      </p:nvGrpSpPr>
-      <p:grpSpPr>
-        <a:xfrm>
-          <a:off x="0" y="0"/>
-          <a:ext cx="0" cy="0"/>
-          <a:chOff x="0" y="0"/>
-          <a:chExt cx="0" cy="0"/>
-        </a:xfrm>
-      </p:grpSpPr>
-      <p:sp>
-        <p:nvSpPr>
-          <p:cNvPr id="2" name="Title 1">
-            <a:extLst>
-              <a:ext uri="{FF2B5EF4-FFF2-40B4-BE49-F238E27FC236}">
-                <a16:creationId xmlns:a16="http://schemas.microsoft.com/office/drawing/2014/main" id="{2F99FDAD-FC0E-31EC-6662-25F79C90E2FC}"/>
-              </a:ext>
-            </a:extLst>
-          </p:cNvPr>
-          <p:cNvSpPr>
-            <a:spLocks noGrp="1"/>
-          </p:cNvSpPr>
-          <p:nvPr>
-            <p:ph type="ctrTitle"/>
-          </p:nvPr>
-        </p:nvSpPr>
-        <p:spPr/>
-        <p:txBody>
-          <a:bodyPr/>
-          <a:lstStyle/>
-          <a:p>
-            <a:r>
-              <a:rPr lang="en-US" dirty="0"/>
-              <a:t>Sample1_device1</a:t>
-            </a:r>
-            <a:endParaRPr lang="ru-RU" dirty="0"/>
-          </a:p>
-        </p:txBody>
-      </p:sp>
-      <p:sp>
-        <p:nvSpPr>
-          <p:cNvPr id="3" name="Subtitle 2">
-            <a:extLst>
-              <a:ext uri="{FF2B5EF4-FFF2-40B4-BE49-F238E27FC236}">
-                <a16:creationId xmlns:a16="http://schemas.microsoft.com/office/drawing/2014/main" id="{54489083-B9F8-4BF6-122F-4A85567FA0F9}"/>
-              </a:ext>
-            </a:extLst>
-          </p:cNvPr>
-          <p:cNvSpPr>
-            <a:spLocks noGrp="1"/>
-          </p:cNvSpPr>
-          <p:nvPr>
-            <p:ph type="subTitle" idx="1"/>
-          </p:nvPr>
-        </p:nvSpPr>
-        <p:spPr/>
-        <p:txBody>
-          <a:bodyPr/>
-          <a:lstStyle/>
-          <a:p>
-            <a:r>
-              <a:rPr lang="en-US" dirty="0" err="1"/>
-              <a:t>th</a:t>
-            </a:r>
-            <a:r>
-              <a:rPr lang="en-US" dirty="0"/>
-              <a:t>=4.5±0.5 nm</a:t>
-            </a:r>
-          </a:p>
-          <a:p>
-            <a:r>
-              <a:rPr lang="en-US" dirty="0"/>
-              <a:t>W = …</a:t>
-            </a:r>
-          </a:p>
-        </p:txBody>
-      </p:sp>
-    </p:spTree>
-    <p:extLst>
-      <p:ext uri="{BB962C8B-B14F-4D97-AF65-F5344CB8AC3E}">
-        <p14:creationId xmlns:p14="http://schemas.microsoft.com/office/powerpoint/2010/main" val="718398661"/>
-      </p:ext>
-    </p:extLst>
-  </p:cSld>
-  <p:clrMapOvr>
-    <a:masterClrMapping/>
-  </p:clrMapOvr>
-</p:sld>
-</file>
-
 <file path=ppt/slides/slide5.xml><?xml version="1.0" encoding="utf-8"?>
 <p:sld xmlns:a="http://schemas.openxmlformats.org/drawingml/2006/main" xmlns:r="http://schemas.openxmlformats.org/officeDocument/2006/relationships" xmlns:p="http://schemas.openxmlformats.org/presentationml/2006/main">
   <p:cSld>
@@ -3846,6 +4059,103 @@
           <p:cNvPr id="2" name="Title 1">
             <a:extLst>
               <a:ext uri="{FF2B5EF4-FFF2-40B4-BE49-F238E27FC236}">
+                <a16:creationId xmlns:a16="http://schemas.microsoft.com/office/drawing/2014/main" id="{2F99FDAD-FC0E-31EC-6662-25F79C90E2FC}"/>
+              </a:ext>
+            </a:extLst>
+          </p:cNvPr>
+          <p:cNvSpPr>
+            <a:spLocks noGrp="1"/>
+          </p:cNvSpPr>
+          <p:nvPr>
+            <p:ph type="ctrTitle"/>
+          </p:nvPr>
+        </p:nvSpPr>
+        <p:spPr/>
+        <p:txBody>
+          <a:bodyPr/>
+          <a:lstStyle/>
+          <a:p>
+            <a:r>
+              <a:rPr lang="en-US" dirty="0"/>
+              <a:t>Sample1_device1</a:t>
+            </a:r>
+            <a:endParaRPr lang="ru-RU" dirty="0"/>
+          </a:p>
+        </p:txBody>
+      </p:sp>
+      <p:sp>
+        <p:nvSpPr>
+          <p:cNvPr id="3" name="Subtitle 2">
+            <a:extLst>
+              <a:ext uri="{FF2B5EF4-FFF2-40B4-BE49-F238E27FC236}">
+                <a16:creationId xmlns:a16="http://schemas.microsoft.com/office/drawing/2014/main" id="{54489083-B9F8-4BF6-122F-4A85567FA0F9}"/>
+              </a:ext>
+            </a:extLst>
+          </p:cNvPr>
+          <p:cNvSpPr>
+            <a:spLocks noGrp="1"/>
+          </p:cNvSpPr>
+          <p:nvPr>
+            <p:ph type="subTitle" idx="1"/>
+          </p:nvPr>
+        </p:nvSpPr>
+        <p:spPr/>
+        <p:txBody>
+          <a:bodyPr/>
+          <a:lstStyle/>
+          <a:p>
+            <a:r>
+              <a:rPr lang="en-US" dirty="0" err="1"/>
+              <a:t>th</a:t>
+            </a:r>
+            <a:r>
+              <a:rPr lang="en-US" dirty="0"/>
+              <a:t>=4.5±0.5 nm</a:t>
+            </a:r>
+          </a:p>
+          <a:p>
+            <a:r>
+              <a:rPr lang="en-US" dirty="0"/>
+              <a:t>W = …</a:t>
+            </a:r>
+          </a:p>
+        </p:txBody>
+      </p:sp>
+    </p:spTree>
+    <p:extLst>
+      <p:ext uri="{BB962C8B-B14F-4D97-AF65-F5344CB8AC3E}">
+        <p14:creationId xmlns:p14="http://schemas.microsoft.com/office/powerpoint/2010/main" val="718398661"/>
+      </p:ext>
+    </p:extLst>
+  </p:cSld>
+  <p:clrMapOvr>
+    <a:masterClrMapping/>
+  </p:clrMapOvr>
+</p:sld>
+</file>
+
+<file path=ppt/slides/slide6.xml><?xml version="1.0" encoding="utf-8"?>
+<p:sld xmlns:a="http://schemas.openxmlformats.org/drawingml/2006/main" xmlns:r="http://schemas.openxmlformats.org/officeDocument/2006/relationships" xmlns:p="http://schemas.openxmlformats.org/presentationml/2006/main">
+  <p:cSld>
+    <p:spTree>
+      <p:nvGrpSpPr>
+        <p:cNvPr id="1" name=""/>
+        <p:cNvGrpSpPr/>
+        <p:nvPr/>
+      </p:nvGrpSpPr>
+      <p:grpSpPr>
+        <a:xfrm>
+          <a:off x="0" y="0"/>
+          <a:ext cx="0" cy="0"/>
+          <a:chOff x="0" y="0"/>
+          <a:chExt cx="0" cy="0"/>
+        </a:xfrm>
+      </p:grpSpPr>
+      <p:sp>
+        <p:nvSpPr>
+          <p:cNvPr id="2" name="Title 1">
+            <a:extLst>
+              <a:ext uri="{FF2B5EF4-FFF2-40B4-BE49-F238E27FC236}">
                 <a16:creationId xmlns:a16="http://schemas.microsoft.com/office/drawing/2014/main" id="{7E7A6FFD-5B6D-2C67-97C7-986C0D44F4AE}"/>
               </a:ext>
             </a:extLst>
@@ -3891,8 +4201,8 @@
           </p:nvPr>
         </p:nvGraphicFramePr>
         <p:xfrm>
-          <a:off x="143541" y="1690688"/>
-          <a:ext cx="6586667" cy="5040000"/>
+          <a:off x="4779743" y="5118200"/>
+          <a:ext cx="3705000" cy="2835000"/>
         </p:xfrm>
         <a:graphic>
           <a:graphicData uri="http://schemas.openxmlformats.org/presentationml/2006/ole">
@@ -3919,8 +4229,8 @@
                     </p:blipFill>
                     <p:spPr>
                       <a:xfrm>
-                        <a:off x="143541" y="1690688"/>
-                        <a:ext cx="6586667" cy="5040000"/>
+                        <a:off x="4779743" y="5118200"/>
+                        <a:ext cx="3705000" cy="2835000"/>
                       </a:xfrm>
                       <a:prstGeom prst="rect">
                         <a:avLst/>
@@ -3937,100 +4247,6 @@
     <p:extLst>
       <p:ext uri="{BB962C8B-B14F-4D97-AF65-F5344CB8AC3E}">
         <p14:creationId xmlns:p14="http://schemas.microsoft.com/office/powerpoint/2010/main" val="3751576251"/>
-      </p:ext>
-    </p:extLst>
-  </p:cSld>
-  <p:clrMapOvr>
-    <a:masterClrMapping/>
-  </p:clrMapOvr>
-</p:sld>
-</file>
-
-<file path=ppt/slides/slide6.xml><?xml version="1.0" encoding="utf-8"?>
-<p:sld xmlns:a="http://schemas.openxmlformats.org/drawingml/2006/main" xmlns:r="http://schemas.openxmlformats.org/officeDocument/2006/relationships" xmlns:p="http://schemas.openxmlformats.org/presentationml/2006/main">
-  <p:cSld>
-    <p:spTree>
-      <p:nvGrpSpPr>
-        <p:cNvPr id="1" name=""/>
-        <p:cNvGrpSpPr/>
-        <p:nvPr/>
-      </p:nvGrpSpPr>
-      <p:grpSpPr>
-        <a:xfrm>
-          <a:off x="0" y="0"/>
-          <a:ext cx="0" cy="0"/>
-          <a:chOff x="0" y="0"/>
-          <a:chExt cx="0" cy="0"/>
-        </a:xfrm>
-      </p:grpSpPr>
-      <p:sp>
-        <p:nvSpPr>
-          <p:cNvPr id="3" name="Title 2">
-            <a:extLst>
-              <a:ext uri="{FF2B5EF4-FFF2-40B4-BE49-F238E27FC236}">
-                <a16:creationId xmlns:a16="http://schemas.microsoft.com/office/drawing/2014/main" id="{D12C7270-753E-BB37-DDD1-EF1150770935}"/>
-              </a:ext>
-            </a:extLst>
-          </p:cNvPr>
-          <p:cNvSpPr>
-            <a:spLocks noGrp="1"/>
-          </p:cNvSpPr>
-          <p:nvPr>
-            <p:ph type="ctrTitle"/>
-          </p:nvPr>
-        </p:nvSpPr>
-        <p:spPr/>
-        <p:txBody>
-          <a:bodyPr/>
-          <a:lstStyle/>
-          <a:p>
-            <a:r>
-              <a:rPr lang="en-US" dirty="0"/>
-              <a:t>Sample1_device3</a:t>
-            </a:r>
-            <a:endParaRPr lang="ru-RU" dirty="0"/>
-          </a:p>
-        </p:txBody>
-      </p:sp>
-      <p:sp>
-        <p:nvSpPr>
-          <p:cNvPr id="4" name="Subtitle 3">
-            <a:extLst>
-              <a:ext uri="{FF2B5EF4-FFF2-40B4-BE49-F238E27FC236}">
-                <a16:creationId xmlns:a16="http://schemas.microsoft.com/office/drawing/2014/main" id="{F5ED6233-0DD2-A1AE-D043-9EC244247077}"/>
-              </a:ext>
-            </a:extLst>
-          </p:cNvPr>
-          <p:cNvSpPr>
-            <a:spLocks noGrp="1"/>
-          </p:cNvSpPr>
-          <p:nvPr>
-            <p:ph type="subTitle" idx="1"/>
-          </p:nvPr>
-        </p:nvSpPr>
-        <p:spPr/>
-        <p:txBody>
-          <a:bodyPr/>
-          <a:lstStyle/>
-          <a:p>
-            <a:r>
-              <a:rPr lang="en-US" dirty="0" err="1"/>
-              <a:t>th</a:t>
-            </a:r>
-            <a:r>
-              <a:rPr lang="en-US" dirty="0"/>
-              <a:t>=6.0±0.6 nm</a:t>
-            </a:r>
-          </a:p>
-          <a:p>
-            <a:endParaRPr lang="ru-RU" dirty="0"/>
-          </a:p>
-        </p:txBody>
-      </p:sp>
-    </p:spTree>
-    <p:extLst>
-      <p:ext uri="{BB962C8B-B14F-4D97-AF65-F5344CB8AC3E}">
-        <p14:creationId xmlns:p14="http://schemas.microsoft.com/office/powerpoint/2010/main" val="1021589506"/>
       </p:ext>
     </p:extLst>
   </p:cSld>
@@ -4059,6 +4275,100 @@
       </p:grpSpPr>
       <p:sp>
         <p:nvSpPr>
+          <p:cNvPr id="3" name="Title 2">
+            <a:extLst>
+              <a:ext uri="{FF2B5EF4-FFF2-40B4-BE49-F238E27FC236}">
+                <a16:creationId xmlns:a16="http://schemas.microsoft.com/office/drawing/2014/main" id="{D12C7270-753E-BB37-DDD1-EF1150770935}"/>
+              </a:ext>
+            </a:extLst>
+          </p:cNvPr>
+          <p:cNvSpPr>
+            <a:spLocks noGrp="1"/>
+          </p:cNvSpPr>
+          <p:nvPr>
+            <p:ph type="ctrTitle"/>
+          </p:nvPr>
+        </p:nvSpPr>
+        <p:spPr/>
+        <p:txBody>
+          <a:bodyPr/>
+          <a:lstStyle/>
+          <a:p>
+            <a:r>
+              <a:rPr lang="en-US" dirty="0"/>
+              <a:t>Sample1_device3</a:t>
+            </a:r>
+            <a:endParaRPr lang="ru-RU" dirty="0"/>
+          </a:p>
+        </p:txBody>
+      </p:sp>
+      <p:sp>
+        <p:nvSpPr>
+          <p:cNvPr id="4" name="Subtitle 3">
+            <a:extLst>
+              <a:ext uri="{FF2B5EF4-FFF2-40B4-BE49-F238E27FC236}">
+                <a16:creationId xmlns:a16="http://schemas.microsoft.com/office/drawing/2014/main" id="{F5ED6233-0DD2-A1AE-D043-9EC244247077}"/>
+              </a:ext>
+            </a:extLst>
+          </p:cNvPr>
+          <p:cNvSpPr>
+            <a:spLocks noGrp="1"/>
+          </p:cNvSpPr>
+          <p:nvPr>
+            <p:ph type="subTitle" idx="1"/>
+          </p:nvPr>
+        </p:nvSpPr>
+        <p:spPr/>
+        <p:txBody>
+          <a:bodyPr/>
+          <a:lstStyle/>
+          <a:p>
+            <a:r>
+              <a:rPr lang="en-US" dirty="0" err="1"/>
+              <a:t>th</a:t>
+            </a:r>
+            <a:r>
+              <a:rPr lang="en-US" dirty="0"/>
+              <a:t>=6.0±0.6 nm</a:t>
+            </a:r>
+          </a:p>
+          <a:p>
+            <a:endParaRPr lang="ru-RU" dirty="0"/>
+          </a:p>
+        </p:txBody>
+      </p:sp>
+    </p:spTree>
+    <p:extLst>
+      <p:ext uri="{BB962C8B-B14F-4D97-AF65-F5344CB8AC3E}">
+        <p14:creationId xmlns:p14="http://schemas.microsoft.com/office/powerpoint/2010/main" val="1021589506"/>
+      </p:ext>
+    </p:extLst>
+  </p:cSld>
+  <p:clrMapOvr>
+    <a:masterClrMapping/>
+  </p:clrMapOvr>
+</p:sld>
+</file>
+
+<file path=ppt/slides/slide8.xml><?xml version="1.0" encoding="utf-8"?>
+<p:sld xmlns:a="http://schemas.openxmlformats.org/drawingml/2006/main" xmlns:r="http://schemas.openxmlformats.org/officeDocument/2006/relationships" xmlns:p="http://schemas.openxmlformats.org/presentationml/2006/main">
+  <p:cSld>
+    <p:spTree>
+      <p:nvGrpSpPr>
+        <p:cNvPr id="1" name=""/>
+        <p:cNvGrpSpPr/>
+        <p:nvPr/>
+      </p:nvGrpSpPr>
+      <p:grpSpPr>
+        <a:xfrm>
+          <a:off x="0" y="0"/>
+          <a:ext cx="0" cy="0"/>
+          <a:chOff x="0" y="0"/>
+          <a:chExt cx="0" cy="0"/>
+        </a:xfrm>
+      </p:grpSpPr>
+      <p:sp>
+        <p:nvSpPr>
           <p:cNvPr id="4" name="Title 3">
             <a:extLst>
               <a:ext uri="{FF2B5EF4-FFF2-40B4-BE49-F238E27FC236}">
@@ -4107,8 +4417,8 @@
           </p:nvPr>
         </p:nvGraphicFramePr>
         <p:xfrm>
-          <a:off x="-490667" y="1690688"/>
-          <a:ext cx="6586667" cy="5040000"/>
+          <a:off x="4423000" y="5118200"/>
+          <a:ext cx="3705000" cy="2835000"/>
         </p:xfrm>
         <a:graphic>
           <a:graphicData uri="http://schemas.openxmlformats.org/presentationml/2006/ole">
@@ -4135,8 +4445,8 @@
                     </p:blipFill>
                     <p:spPr>
                       <a:xfrm>
-                        <a:off x="-490667" y="1690688"/>
-                        <a:ext cx="6586667" cy="5040000"/>
+                        <a:off x="4423000" y="5118200"/>
+                        <a:ext cx="3705000" cy="2835000"/>
                       </a:xfrm>
                       <a:prstGeom prst="rect">
                         <a:avLst/>
@@ -4162,7 +4472,7 @@
 </p:sld>
 </file>
 
-<file path=ppt/slides/slide8.xml><?xml version="1.0" encoding="utf-8"?>
+<file path=ppt/slides/slide9.xml><?xml version="1.0" encoding="utf-8"?>
 <p:sld xmlns:a="http://schemas.openxmlformats.org/drawingml/2006/main" xmlns:r="http://schemas.openxmlformats.org/officeDocument/2006/relationships" xmlns:p="http://schemas.openxmlformats.org/presentationml/2006/main">
   <p:cSld>
     <p:spTree>
@@ -4229,8 +4539,8 @@
           </p:nvPr>
         </p:nvGraphicFramePr>
         <p:xfrm>
-          <a:off x="-196645" y="1690688"/>
-          <a:ext cx="6586667" cy="5040000"/>
+          <a:off x="4588388" y="5118200"/>
+          <a:ext cx="3705000" cy="2835000"/>
         </p:xfrm>
         <a:graphic>
           <a:graphicData uri="http://schemas.openxmlformats.org/presentationml/2006/ole">
@@ -4257,8 +4567,8 @@
                     </p:blipFill>
                     <p:spPr>
                       <a:xfrm>
-                        <a:off x="-196645" y="1690688"/>
-                        <a:ext cx="6586667" cy="5040000"/>
+                        <a:off x="4588388" y="5118200"/>
+                        <a:ext cx="3705000" cy="2835000"/>
                       </a:xfrm>
                       <a:prstGeom prst="rect">
                         <a:avLst/>
@@ -4292,8 +4602,8 @@
           </p:nvPr>
         </p:nvGraphicFramePr>
         <p:xfrm>
-          <a:off x="5801978" y="1690688"/>
-          <a:ext cx="6586667" cy="5040000"/>
+          <a:off x="7962614" y="5118200"/>
+          <a:ext cx="3705000" cy="2835000"/>
         </p:xfrm>
         <a:graphic>
           <a:graphicData uri="http://schemas.openxmlformats.org/presentationml/2006/ole">
@@ -4320,8 +4630,8 @@
                     </p:blipFill>
                     <p:spPr>
                       <a:xfrm>
-                        <a:off x="5801978" y="1690688"/>
-                        <a:ext cx="6586667" cy="5040000"/>
+                        <a:off x="7962614" y="5118200"/>
+                        <a:ext cx="3705000" cy="2835000"/>
                       </a:xfrm>
                       <a:prstGeom prst="rect">
                         <a:avLst/>
@@ -4347,132 +4657,10 @@
 </p:sld>
 </file>
 
-<file path=ppt/slides/slide9.xml><?xml version="1.0" encoding="utf-8"?>
-<p:sld xmlns:a="http://schemas.openxmlformats.org/drawingml/2006/main" xmlns:r="http://schemas.openxmlformats.org/officeDocument/2006/relationships" xmlns:p="http://schemas.openxmlformats.org/presentationml/2006/main">
-  <p:cSld>
-    <p:spTree>
-      <p:nvGrpSpPr>
-        <p:cNvPr id="1" name=""/>
-        <p:cNvGrpSpPr/>
-        <p:nvPr/>
-      </p:nvGrpSpPr>
-      <p:grpSpPr>
-        <a:xfrm>
-          <a:off x="0" y="0"/>
-          <a:ext cx="0" cy="0"/>
-          <a:chOff x="0" y="0"/>
-          <a:chExt cx="0" cy="0"/>
-        </a:xfrm>
-      </p:grpSpPr>
-      <p:sp>
-        <p:nvSpPr>
-          <p:cNvPr id="2" name="Title 1">
-            <a:extLst>
-              <a:ext uri="{FF2B5EF4-FFF2-40B4-BE49-F238E27FC236}">
-                <a16:creationId xmlns:a16="http://schemas.microsoft.com/office/drawing/2014/main" id="{9FA9D8D4-9E4D-588E-C872-2671D87DBF25}"/>
-              </a:ext>
-            </a:extLst>
-          </p:cNvPr>
-          <p:cNvSpPr>
-            <a:spLocks noGrp="1"/>
-          </p:cNvSpPr>
-          <p:nvPr>
-            <p:ph type="title"/>
-          </p:nvPr>
-        </p:nvSpPr>
-        <p:spPr/>
-        <p:txBody>
-          <a:bodyPr/>
-          <a:lstStyle/>
-          <a:p>
-            <a:r>
-              <a:rPr lang="en-US" dirty="0"/>
-              <a:t>Sample1_device3</a:t>
-            </a:r>
-            <a:endParaRPr lang="ru-RU" dirty="0"/>
-          </a:p>
-        </p:txBody>
-      </p:sp>
-      <p:graphicFrame>
-        <p:nvGraphicFramePr>
-          <p:cNvPr id="3" name="Object 2">
-            <a:extLst>
-              <a:ext uri="{FF2B5EF4-FFF2-40B4-BE49-F238E27FC236}">
-                <a16:creationId xmlns:a16="http://schemas.microsoft.com/office/drawing/2014/main" id="{B3141EB9-6C8D-DF68-B3AF-46CB72560F58}"/>
-              </a:ext>
-            </a:extLst>
-          </p:cNvPr>
-          <p:cNvGraphicFramePr>
-            <a:graphicFrameLocks noChangeAspect="1"/>
-          </p:cNvGraphicFramePr>
-          <p:nvPr>
-            <p:extLst>
-              <p:ext uri="{D42A27DB-BD31-4B8C-83A1-F6EECF244321}">
-                <p14:modId xmlns:p14="http://schemas.microsoft.com/office/powerpoint/2010/main" val="1809738738"/>
-              </p:ext>
-            </p:extLst>
-          </p:nvPr>
-        </p:nvGraphicFramePr>
-        <p:xfrm>
-          <a:off x="320521" y="1690688"/>
-          <a:ext cx="6586667" cy="5040000"/>
-        </p:xfrm>
-        <a:graphic>
-          <a:graphicData uri="http://schemas.openxmlformats.org/presentationml/2006/ole">
-            <mc:AlternateContent xmlns:mc="http://schemas.openxmlformats.org/markup-compatibility/2006">
-              <mc:Choice xmlns:v="urn:schemas-microsoft-com:vml" Requires="v">
-                <p:oleObj name="Graph" r:id="rId2" imgW="3920760" imgH="3000960" progId="Origin95.Graph">
-                  <p:embed/>
-                </p:oleObj>
-              </mc:Choice>
-              <mc:Fallback>
-                <p:oleObj name="Graph" r:id="rId2" imgW="3920760" imgH="3000960" progId="Origin95.Graph">
-                  <p:embed/>
-                  <p:pic>
-                    <p:nvPicPr>
-                      <p:cNvPr id="0" name=""/>
-                      <p:cNvPicPr/>
-                      <p:nvPr/>
-                    </p:nvPicPr>
-                    <p:blipFill>
-                      <a:blip r:embed="rId3"/>
-                      <a:stretch>
-                        <a:fillRect/>
-                      </a:stretch>
-                    </p:blipFill>
-                    <p:spPr>
-                      <a:xfrm>
-                        <a:off x="320521" y="1690688"/>
-                        <a:ext cx="6586667" cy="5040000"/>
-                      </a:xfrm>
-                      <a:prstGeom prst="rect">
-                        <a:avLst/>
-                      </a:prstGeom>
-                    </p:spPr>
-                  </p:pic>
-                </p:oleObj>
-              </mc:Fallback>
-            </mc:AlternateContent>
-          </a:graphicData>
-        </a:graphic>
-      </p:graphicFrame>
-    </p:spTree>
-    <p:extLst>
-      <p:ext uri="{BB962C8B-B14F-4D97-AF65-F5344CB8AC3E}">
-        <p14:creationId xmlns:p14="http://schemas.microsoft.com/office/powerpoint/2010/main" val="2392298662"/>
-      </p:ext>
-    </p:extLst>
-  </p:cSld>
-  <p:clrMapOvr>
-    <a:masterClrMapping/>
-  </p:clrMapOvr>
-</p:sld>
-</file>
-
 <file path=ppt/theme/theme1.xml><?xml version="1.0" encoding="utf-8"?>
 <a:theme xmlns:a="http://schemas.openxmlformats.org/drawingml/2006/main" name="Office Theme">
   <a:themeElements>
-    <a:clrScheme name="Office">
+    <a:clrScheme name="Office Theme">
       <a:dk1>
         <a:sysClr val="windowText" lastClr="000000"/>
       </a:dk1>
@@ -4510,7 +4698,7 @@
         <a:srgbClr val="954F72"/>
       </a:folHlink>
     </a:clrScheme>
-    <a:fontScheme name="Office">
+    <a:fontScheme name="Office Theme">
       <a:majorFont>
         <a:latin typeface="Calibri Light" panose="020F0302020204030204"/>
         <a:ea typeface=""/>
@@ -4545,23 +4733,6 @@
         <a:font script="Viet" typeface="Times New Roman"/>
         <a:font script="Uigh" typeface="Microsoft Uighur"/>
         <a:font script="Geor" typeface="Sylfaen"/>
-        <a:font script="Armn" typeface="Arial"/>
-        <a:font script="Bugi" typeface="Leelawadee UI"/>
-        <a:font script="Bopo" typeface="Microsoft JhengHei"/>
-        <a:font script="Java" typeface="Javanese Text"/>
-        <a:font script="Lisu" typeface="Segoe UI"/>
-        <a:font script="Mymr" typeface="Myanmar Text"/>
-        <a:font script="Nkoo" typeface="Ebrima"/>
-        <a:font script="Olck" typeface="Nirmala UI"/>
-        <a:font script="Osma" typeface="Ebrima"/>
-        <a:font script="Phag" typeface="Phagspa"/>
-        <a:font script="Syrn" typeface="Estrangelo Edessa"/>
-        <a:font script="Syrj" typeface="Estrangelo Edessa"/>
-        <a:font script="Syre" typeface="Estrangelo Edessa"/>
-        <a:font script="Sora" typeface="Nirmala UI"/>
-        <a:font script="Tale" typeface="Microsoft Tai Le"/>
-        <a:font script="Talu" typeface="Microsoft New Tai Lue"/>
-        <a:font script="Tfng" typeface="Ebrima"/>
       </a:majorFont>
       <a:minorFont>
         <a:latin typeface="Calibri" panose="020F0502020204030204"/>
@@ -4597,26 +4768,9 @@
         <a:font script="Viet" typeface="Arial"/>
         <a:font script="Uigh" typeface="Microsoft Uighur"/>
         <a:font script="Geor" typeface="Sylfaen"/>
-        <a:font script="Armn" typeface="Arial"/>
-        <a:font script="Bugi" typeface="Leelawadee UI"/>
-        <a:font script="Bopo" typeface="Microsoft JhengHei"/>
-        <a:font script="Java" typeface="Javanese Text"/>
-        <a:font script="Lisu" typeface="Segoe UI"/>
-        <a:font script="Mymr" typeface="Myanmar Text"/>
-        <a:font script="Nkoo" typeface="Ebrima"/>
-        <a:font script="Olck" typeface="Nirmala UI"/>
-        <a:font script="Osma" typeface="Ebrima"/>
-        <a:font script="Phag" typeface="Phagspa"/>
-        <a:font script="Syrn" typeface="Estrangelo Edessa"/>
-        <a:font script="Syrj" typeface="Estrangelo Edessa"/>
-        <a:font script="Syre" typeface="Estrangelo Edessa"/>
-        <a:font script="Sora" typeface="Nirmala UI"/>
-        <a:font script="Tale" typeface="Microsoft Tai Le"/>
-        <a:font script="Talu" typeface="Microsoft New Tai Lue"/>
-        <a:font script="Tfng" typeface="Ebrima"/>
       </a:minorFont>
     </a:fontScheme>
-    <a:fmtScheme name="Office">
+    <a:fmtScheme name="Office Theme">
       <a:fillStyleLst>
         <a:solidFill>
           <a:schemeClr val="phClr"/>
@@ -4758,7 +4912,7 @@
   <a:extraClrSchemeLst/>
   <a:extLst>
     <a:ext uri="{05A4C25C-085E-4340-85A3-A5531E510DB2}">
-      <thm15:themeFamily xmlns:thm15="http://schemas.microsoft.com/office/thememl/2012/main" name="Office Theme" id="{62F939B6-93AF-4DB8-9C6B-D6C7DFDC589F}" vid="{4A3C46E8-61CC-4603-A589-7422A47A8E4A}"/>
+      <thm15:themeFamily xmlns:thm15="http://schemas.microsoft.com/office/thememl/2012/main" name="Office 2013 - 2022 Theme" id="{62F939B6-93AF-4DB8-9C6B-D6C7DFDC589F}" vid="{4A3C46E8-61CC-4603-A589-7422A47A8E4A}"/>
     </a:ext>
   </a:extLst>
 </a:theme>

</xml_diff>